<commit_message>
f22 week 6 updates
</commit_message>
<xml_diff>
--- a/Week06/DomManipulationIntro.pptx
+++ b/Week06/DomManipulationIntro.pptx
@@ -5,7 +5,7 @@
     <p:sldMasterId id="2147483648" r:id="rId1"/>
   </p:sldMasterIdLst>
   <p:notesMasterIdLst>
-    <p:notesMasterId r:id="rId12"/>
+    <p:notesMasterId r:id="rId13"/>
   </p:notesMasterIdLst>
   <p:sldIdLst>
     <p:sldId id="258" r:id="rId2"/>
@@ -18,6 +18,7 @@
     <p:sldId id="314" r:id="rId9"/>
     <p:sldId id="315" r:id="rId10"/>
     <p:sldId id="316" r:id="rId11"/>
+    <p:sldId id="317" r:id="rId12"/>
   </p:sldIdLst>
   <p:sldSz cx="12192000" cy="6858000"/>
   <p:notesSz cx="6858000" cy="9144000"/>
@@ -217,7 +218,7 @@
           <a:p>
             <a:fld id="{19104133-B5B0-4351-8158-4F0E5EB1E2BF}" type="datetimeFigureOut">
               <a:rPr lang="en-US" smtClean="0"/>
-              <a:t>3/26/2020</a:t>
+              <a:t>9/6/2022</a:t>
             </a:fld>
             <a:endParaRPr lang="en-US"/>
           </a:p>
@@ -281,38 +282,37 @@
           <a:p>
             <a:pPr lvl="0"/>
             <a:r>
-              <a:rPr lang="en-US" smtClean="0"/>
+              <a:rPr lang="en-US"/>
               <a:t>Edit Master text styles</a:t>
             </a:r>
           </a:p>
           <a:p>
             <a:pPr lvl="1"/>
             <a:r>
-              <a:rPr lang="en-US" smtClean="0"/>
+              <a:rPr lang="en-US"/>
               <a:t>Second level</a:t>
             </a:r>
           </a:p>
           <a:p>
             <a:pPr lvl="2"/>
             <a:r>
-              <a:rPr lang="en-US" smtClean="0"/>
+              <a:rPr lang="en-US"/>
               <a:t>Third level</a:t>
             </a:r>
           </a:p>
           <a:p>
             <a:pPr lvl="3"/>
             <a:r>
-              <a:rPr lang="en-US" smtClean="0"/>
+              <a:rPr lang="en-US"/>
               <a:t>Fourth level</a:t>
             </a:r>
           </a:p>
           <a:p>
             <a:pPr lvl="4"/>
             <a:r>
-              <a:rPr lang="en-US" smtClean="0"/>
+              <a:rPr lang="en-US"/>
               <a:t>Fifth level</a:t>
             </a:r>
-            <a:endParaRPr lang="en-US"/>
           </a:p>
         </p:txBody>
       </p:sp>
@@ -530,29 +530,29 @@
           <a:lstStyle/>
           <a:p>
             <a:r>
-              <a:rPr lang="en-US" dirty="0" smtClean="0"/>
+              <a:rPr lang="en-US" dirty="0"/>
               <a:t>Ask a student what</a:t>
             </a:r>
             <a:r>
-              <a:rPr lang="en-US" baseline="0" dirty="0" smtClean="0"/>
+              <a:rPr lang="en-US" baseline="0" dirty="0"/>
               <a:t> would happen if the code is run – a dialog box shows up allowing the user to enter a name, stored in the </a:t>
             </a:r>
             <a:r>
-              <a:rPr lang="en-US" b="1" baseline="0" dirty="0" smtClean="0"/>
+              <a:rPr lang="en-US" b="1" baseline="0" dirty="0"/>
               <a:t>name</a:t>
             </a:r>
             <a:r>
-              <a:rPr lang="en-US" b="0" baseline="0" dirty="0" smtClean="0"/>
+              <a:rPr lang="en-US" b="0" baseline="0" dirty="0"/>
               <a:t> variable.</a:t>
             </a:r>
-            <a:endParaRPr lang="en-US" baseline="0" dirty="0" smtClean="0"/>
+            <a:endParaRPr lang="en-US" baseline="0" dirty="0"/>
           </a:p>
           <a:p>
-            <a:endParaRPr lang="en-US" baseline="0" dirty="0" smtClean="0"/>
+            <a:endParaRPr lang="en-US" baseline="0" dirty="0"/>
           </a:p>
           <a:p>
             <a:r>
-              <a:rPr lang="en-US" baseline="0" dirty="0" smtClean="0"/>
+              <a:rPr lang="en-US" baseline="0" dirty="0"/>
               <a:t>Then ask the students what is wrong with prompts – the user experience is bad.</a:t>
             </a:r>
             <a:endParaRPr lang="en-US" dirty="0"/>
@@ -640,20 +640,20 @@
           <a:lstStyle/>
           <a:p>
             <a:r>
-              <a:rPr lang="en-US" dirty="0" smtClean="0"/>
+              <a:rPr lang="en-US" dirty="0"/>
               <a:t>Ask a student how this HTML</a:t>
             </a:r>
             <a:r>
-              <a:rPr lang="en-US" baseline="0" dirty="0" smtClean="0"/>
+              <a:rPr lang="en-US" baseline="0" dirty="0"/>
               <a:t> would render – it would be a form with an input.</a:t>
             </a:r>
           </a:p>
           <a:p>
-            <a:endParaRPr lang="en-US" baseline="0" dirty="0" smtClean="0"/>
+            <a:endParaRPr lang="en-US" baseline="0" dirty="0"/>
           </a:p>
           <a:p>
             <a:r>
-              <a:rPr lang="en-US" baseline="0" dirty="0" smtClean="0"/>
+              <a:rPr lang="en-US" baseline="0" dirty="0"/>
               <a:t>Then ask the students how forms work – a back-end is required to handle submissions.</a:t>
             </a:r>
             <a:endParaRPr lang="en-US" dirty="0"/>
@@ -741,11 +741,11 @@
           <a:lstStyle/>
           <a:p>
             <a:r>
-              <a:rPr lang="en-US" dirty="0" smtClean="0"/>
+              <a:rPr lang="en-US" dirty="0"/>
               <a:t>Ask the students if they can guess what</a:t>
             </a:r>
             <a:r>
-              <a:rPr lang="en-US" baseline="0" dirty="0" smtClean="0"/>
+              <a:rPr lang="en-US" baseline="0" dirty="0"/>
               <a:t> D.O.M. stands for</a:t>
             </a:r>
             <a:endParaRPr lang="en-US" dirty="0"/>
@@ -833,27 +833,27 @@
           <a:lstStyle/>
           <a:p>
             <a:r>
-              <a:rPr lang="en-US" dirty="0" smtClean="0"/>
+              <a:rPr lang="en-US" dirty="0"/>
               <a:t>Ask the students to name the data types that we have covered already – </a:t>
             </a:r>
             <a:r>
-              <a:rPr lang="en-US" b="1" dirty="0" smtClean="0"/>
+              <a:rPr lang="en-US" b="1" dirty="0"/>
               <a:t>number</a:t>
             </a:r>
             <a:r>
-              <a:rPr lang="en-US" b="0" dirty="0" smtClean="0"/>
+              <a:rPr lang="en-US" b="0" dirty="0"/>
               <a:t>, </a:t>
             </a:r>
             <a:r>
-              <a:rPr lang="en-US" b="1" dirty="0" smtClean="0"/>
+              <a:rPr lang="en-US" b="1" dirty="0"/>
               <a:t>string</a:t>
             </a:r>
             <a:r>
-              <a:rPr lang="en-US" b="0" dirty="0" smtClean="0"/>
+              <a:rPr lang="en-US" b="0" dirty="0"/>
               <a:t>, </a:t>
             </a:r>
             <a:r>
-              <a:rPr lang="en-US" b="1" dirty="0" err="1" smtClean="0"/>
+              <a:rPr lang="en-US" b="1" dirty="0" err="1"/>
               <a:t>boolean</a:t>
             </a:r>
             <a:endParaRPr lang="en-US" dirty="0"/>
@@ -941,28 +941,28 @@
           <a:lstStyle/>
           <a:p>
             <a:r>
-              <a:rPr lang="en-US" dirty="0" smtClean="0"/>
+              <a:rPr lang="en-US" dirty="0"/>
               <a:t>Ask the students how to select an HTML element by ID in CSS. Then,</a:t>
             </a:r>
             <a:r>
-              <a:rPr lang="en-US" baseline="0" dirty="0" smtClean="0"/>
+              <a:rPr lang="en-US" baseline="0" dirty="0"/>
               <a:t> show them how it is possible to do the same thing in JavaScript.</a:t>
             </a:r>
           </a:p>
           <a:p>
-            <a:endParaRPr lang="en-US" baseline="0" dirty="0" smtClean="0"/>
+            <a:endParaRPr lang="en-US" baseline="0" dirty="0"/>
           </a:p>
           <a:p>
             <a:r>
-              <a:rPr lang="en-US" baseline="0" dirty="0" smtClean="0"/>
+              <a:rPr lang="en-US" baseline="0" dirty="0"/>
               <a:t>The next slide will break down the statement that uses </a:t>
             </a:r>
             <a:r>
-              <a:rPr lang="en-US" b="1" baseline="0" dirty="0" err="1" smtClean="0"/>
+              <a:rPr lang="en-US" b="1" baseline="0" dirty="0" err="1"/>
               <a:t>document.querySelector</a:t>
             </a:r>
             <a:r>
-              <a:rPr lang="en-US" b="0" baseline="0" dirty="0" smtClean="0"/>
+              <a:rPr lang="en-US" b="0" baseline="0" dirty="0"/>
               <a:t> to take an HTML element and store it in JavaScript.</a:t>
             </a:r>
             <a:endParaRPr lang="en-US" dirty="0"/>
@@ -1050,20 +1050,20 @@
           <a:lstStyle/>
           <a:p>
             <a:r>
-              <a:rPr lang="en-US" dirty="0" smtClean="0"/>
+              <a:rPr lang="en-US" dirty="0"/>
               <a:t>Show how to get the text value from an input.</a:t>
             </a:r>
           </a:p>
           <a:p>
-            <a:endParaRPr lang="en-US" dirty="0" smtClean="0"/>
+            <a:endParaRPr lang="en-US" dirty="0"/>
           </a:p>
           <a:p>
             <a:r>
-              <a:rPr lang="en-US" dirty="0" smtClean="0"/>
+              <a:rPr lang="en-US" dirty="0"/>
               <a:t>Emphasize</a:t>
             </a:r>
             <a:r>
-              <a:rPr lang="en-US" baseline="0" dirty="0" smtClean="0"/>
+              <a:rPr lang="en-US" baseline="0" dirty="0"/>
               <a:t> that this is all the code the students will need to get the value a user has entered in an HTML input, and use it in their JavaScript code. This is mostly boiler-plate, the only things they need to customize are:</a:t>
             </a:r>
           </a:p>
@@ -1073,23 +1073,23 @@
               <a:buChar char="-"/>
             </a:pPr>
             <a:r>
-              <a:rPr lang="en-US" baseline="0" dirty="0" smtClean="0"/>
+              <a:rPr lang="en-US" baseline="0" dirty="0"/>
               <a:t>Variable names (</a:t>
             </a:r>
             <a:r>
-              <a:rPr lang="en-US" b="1" baseline="0" dirty="0" smtClean="0"/>
+              <a:rPr lang="en-US" b="1" baseline="0" dirty="0"/>
               <a:t>el</a:t>
             </a:r>
             <a:r>
-              <a:rPr lang="en-US" b="0" baseline="0" dirty="0" smtClean="0"/>
+              <a:rPr lang="en-US" b="0" baseline="0" dirty="0"/>
               <a:t> and </a:t>
             </a:r>
             <a:r>
-              <a:rPr lang="en-US" b="1" baseline="0" dirty="0" err="1" smtClean="0"/>
+              <a:rPr lang="en-US" b="1" baseline="0" dirty="0" err="1"/>
               <a:t>elementTextValue</a:t>
             </a:r>
             <a:r>
-              <a:rPr lang="en-US" b="0" baseline="0" dirty="0" smtClean="0"/>
+              <a:rPr lang="en-US" b="0" baseline="0" dirty="0"/>
               <a:t>)</a:t>
             </a:r>
           </a:p>
@@ -1099,19 +1099,15 @@
               <a:buChar char="-"/>
             </a:pPr>
             <a:r>
-              <a:rPr lang="en-US" b="0" baseline="0" dirty="0" smtClean="0"/>
+              <a:rPr lang="en-US" b="0" baseline="0" dirty="0"/>
               <a:t>Selector (</a:t>
             </a:r>
             <a:r>
-              <a:rPr lang="en-US" b="1" baseline="0" dirty="0" smtClean="0"/>
-              <a:t>#</a:t>
+              <a:rPr lang="en-US" b="1" baseline="0" dirty="0"/>
+              <a:t>#my-input</a:t>
             </a:r>
             <a:r>
-              <a:rPr lang="en-US" b="1" baseline="0" dirty="0" err="1" smtClean="0"/>
-              <a:t>myInput</a:t>
-            </a:r>
-            <a:r>
-              <a:rPr lang="en-US" b="0" baseline="0" dirty="0" smtClean="0"/>
+              <a:rPr lang="en-US" b="0" baseline="0" dirty="0"/>
               <a:t>)</a:t>
             </a:r>
             <a:endParaRPr lang="en-US" dirty="0"/>
@@ -1199,43 +1195,39 @@
           <a:lstStyle/>
           <a:p>
             <a:r>
-              <a:rPr lang="en-US" dirty="0" smtClean="0"/>
+              <a:rPr lang="en-US" dirty="0"/>
               <a:t>For the </a:t>
             </a:r>
             <a:r>
-              <a:rPr lang="en-US" dirty="0" err="1" smtClean="0"/>
+              <a:rPr lang="en-US" dirty="0" err="1"/>
               <a:t>Repl</a:t>
             </a:r>
             <a:r>
-              <a:rPr lang="en-US" dirty="0" smtClean="0"/>
+              <a:rPr lang="en-US" dirty="0"/>
               <a:t>,</a:t>
             </a:r>
             <a:r>
-              <a:rPr lang="en-US" baseline="0" dirty="0" smtClean="0"/>
-              <a:t> </a:t>
-            </a:r>
-            <a:r>
-              <a:rPr lang="en-US" baseline="0" dirty="0" smtClean="0"/>
-              <a:t>show how DOM manipulation makes it possible to access the value of an HTML input in JavaScript.</a:t>
+              <a:rPr lang="en-US" baseline="0" dirty="0"/>
+              <a:t> show how DOM manipulation makes it possible to access the value of an HTML input in JavaScript.</a:t>
             </a:r>
           </a:p>
           <a:p>
-            <a:endParaRPr lang="en-US" baseline="0" dirty="0" smtClean="0"/>
+            <a:endParaRPr lang="en-US" baseline="0" dirty="0"/>
           </a:p>
           <a:p>
             <a:r>
-              <a:rPr lang="en-US" baseline="0" dirty="0" smtClean="0"/>
+              <a:rPr lang="en-US" baseline="0" dirty="0"/>
               <a:t>Emphasize the boiler-plate nature of the code; most of it will stay exactly the same to get the value from another input. The important thing is the </a:t>
             </a:r>
             <a:r>
-              <a:rPr lang="en-US" b="1" baseline="0" dirty="0" smtClean="0"/>
+              <a:rPr lang="en-US" b="1" baseline="0" dirty="0"/>
               <a:t>id</a:t>
             </a:r>
             <a:r>
-              <a:rPr lang="en-US" b="0" baseline="0" dirty="0" smtClean="0"/>
+              <a:rPr lang="en-US" b="0" baseline="0" dirty="0"/>
               <a:t> attribute value.</a:t>
             </a:r>
-            <a:endParaRPr lang="en-US" baseline="0" dirty="0" smtClean="0"/>
+            <a:endParaRPr lang="en-US" baseline="0" dirty="0"/>
           </a:p>
         </p:txBody>
       </p:sp>
@@ -1415,15 +1407,7 @@
           <a:p>
             <a:r>
               <a:rPr lang="en-US" dirty="0"/>
-              <a:t>Click to edit Master </a:t>
-            </a:r>
-            <a:r>
-              <a:rPr lang="en-US" dirty="0" smtClean="0"/>
-              <a:t>subtitle </a:t>
-            </a:r>
-            <a:r>
-              <a:rPr lang="en-US" dirty="0"/>
-              <a:t>style</a:t>
+              <a:t>Click to edit Master subtitle style</a:t>
             </a:r>
           </a:p>
         </p:txBody>
@@ -1465,7 +1449,7 @@
             <a:fld id="{1C2D31DE-C454-491C-B5C3-F097855E3DF7}" type="datetime4">
               <a:rPr lang="en-US" smtClean="0"/>
               <a:pPr/>
-              <a:t>March 26, 2020</a:t>
+              <a:t>September 6, 2022</a:t>
             </a:fld>
             <a:endParaRPr lang="en-US" dirty="0"/>
           </a:p>
@@ -4539,17 +4523,16 @@
           <a:p>
             <a:pPr lvl="0"/>
             <a:r>
-              <a:rPr lang="en-US" dirty="0" smtClean="0"/>
+              <a:rPr lang="en-US" dirty="0"/>
               <a:t>Presenter Name</a:t>
             </a:r>
             <a:br>
-              <a:rPr lang="en-US" dirty="0" smtClean="0"/>
+              <a:rPr lang="en-US" dirty="0"/>
             </a:br>
             <a:r>
-              <a:rPr lang="en-US" dirty="0" smtClean="0"/>
+              <a:rPr lang="en-US" dirty="0"/>
               <a:t>Presenter Title</a:t>
             </a:r>
-            <a:endParaRPr lang="en-US" dirty="0"/>
           </a:p>
         </p:txBody>
       </p:sp>
@@ -4566,13 +4549,6 @@
   <p:transition>
     <p:fade/>
   </p:transition>
-  <p:timing>
-    <p:tnLst>
-      <p:par>
-        <p:cTn id="1" dur="indefinite" restart="never" nodeType="tmRoot"/>
-      </p:par>
-    </p:tnLst>
-  </p:timing>
   <p:hf sldNum="0" hdr="0" ftr="0"/>
 </p:sldLayout>
 </file>
@@ -4865,7 +4841,7 @@
           <a:p>
             <a:fld id="{5958763E-B898-436D-883D-03711491D54A}" type="datetimeFigureOut">
               <a:rPr lang="en-US" smtClean="0"/>
-              <a:t>3/26/2020</a:t>
+              <a:t>9/6/2022</a:t>
             </a:fld>
             <a:endParaRPr lang="en-US"/>
           </a:p>
@@ -4938,13 +4914,6 @@
   <p:transition>
     <p:fade/>
   </p:transition>
-  <p:timing>
-    <p:tnLst>
-      <p:par>
-        <p:cTn id="1" dur="indefinite" restart="never" nodeType="tmRoot"/>
-      </p:par>
-    </p:tnLst>
-  </p:timing>
 </p:sldLayout>
 </file>
 
@@ -4993,10 +4962,9 @@
           </a:lstStyle>
           <a:p>
             <a:r>
-              <a:rPr lang="en-US" dirty="0" smtClean="0"/>
+              <a:rPr lang="en-US" dirty="0"/>
               <a:t>Click icon to add picture</a:t>
             </a:r>
-            <a:endParaRPr lang="en-US" dirty="0"/>
           </a:p>
         </p:txBody>
       </p:sp>
@@ -5066,7 +5034,7 @@
           <a:p>
             <a:fld id="{5958763E-B898-436D-883D-03711491D54A}" type="datetimeFigureOut">
               <a:rPr lang="en-US" smtClean="0"/>
-              <a:t>3/26/2020</a:t>
+              <a:t>9/6/2022</a:t>
             </a:fld>
             <a:endParaRPr lang="en-US"/>
           </a:p>
@@ -5139,13 +5107,6 @@
   <p:transition>
     <p:fade/>
   </p:transition>
-  <p:timing>
-    <p:tnLst>
-      <p:par>
-        <p:cTn id="1" dur="indefinite" restart="never" nodeType="tmRoot"/>
-      </p:par>
-    </p:tnLst>
-  </p:timing>
 </p:sldLayout>
 </file>
 
@@ -5323,7 +5284,7 @@
           <a:p>
             <a:fld id="{5958763E-B898-436D-883D-03711491D54A}" type="datetimeFigureOut">
               <a:rPr lang="en-US" smtClean="0"/>
-              <a:t>3/26/2020</a:t>
+              <a:t>9/6/2022</a:t>
             </a:fld>
             <a:endParaRPr lang="en-US"/>
           </a:p>
@@ -5396,13 +5357,6 @@
   <p:transition>
     <p:fade/>
   </p:transition>
-  <p:timing>
-    <p:tnLst>
-      <p:par>
-        <p:cTn id="1" dur="indefinite" restart="never" nodeType="tmRoot"/>
-      </p:par>
-    </p:tnLst>
-  </p:timing>
 </p:sldLayout>
 </file>
 
@@ -5678,7 +5632,7 @@
           <a:p>
             <a:fld id="{5958763E-B898-436D-883D-03711491D54A}" type="datetimeFigureOut">
               <a:rPr lang="en-US" smtClean="0"/>
-              <a:t>3/26/2020</a:t>
+              <a:t>9/6/2022</a:t>
             </a:fld>
             <a:endParaRPr lang="en-US"/>
           </a:p>
@@ -5739,13 +5693,6 @@
   <p:transition>
     <p:fade/>
   </p:transition>
-  <p:timing>
-    <p:tnLst>
-      <p:par>
-        <p:cTn id="1" dur="indefinite" restart="never" nodeType="tmRoot"/>
-      </p:par>
-    </p:tnLst>
-  </p:timing>
 </p:sldLayout>
 </file>
 
@@ -6101,7 +6048,7 @@
           <a:p>
             <a:fld id="{5958763E-B898-436D-883D-03711491D54A}" type="datetimeFigureOut">
               <a:rPr lang="en-US" smtClean="0"/>
-              <a:t>3/26/2020</a:t>
+              <a:t>9/6/2022</a:t>
             </a:fld>
             <a:endParaRPr lang="en-US"/>
           </a:p>
@@ -6162,13 +6109,6 @@
   <p:transition>
     <p:fade/>
   </p:transition>
-  <p:timing>
-    <p:tnLst>
-      <p:par>
-        <p:cTn id="1" dur="indefinite" restart="never" nodeType="tmRoot"/>
-      </p:par>
-    </p:tnLst>
-  </p:timing>
 </p:sldLayout>
 </file>
 
@@ -6609,7 +6549,7 @@
           <a:p>
             <a:fld id="{5958763E-B898-436D-883D-03711491D54A}" type="datetimeFigureOut">
               <a:rPr lang="en-US" smtClean="0"/>
-              <a:t>3/26/2020</a:t>
+              <a:t>9/6/2022</a:t>
             </a:fld>
             <a:endParaRPr lang="en-US"/>
           </a:p>
@@ -6670,13 +6610,6 @@
   <p:transition>
     <p:fade/>
   </p:transition>
-  <p:timing>
-    <p:tnLst>
-      <p:par>
-        <p:cTn id="1" dur="indefinite" restart="never" nodeType="tmRoot"/>
-      </p:par>
-    </p:tnLst>
-  </p:timing>
 </p:sldLayout>
 </file>
 
@@ -7067,7 +7000,7 @@
           <a:p>
             <a:fld id="{5958763E-B898-436D-883D-03711491D54A}" type="datetimeFigureOut">
               <a:rPr lang="en-US" smtClean="0"/>
-              <a:t>3/26/2020</a:t>
+              <a:t>9/6/2022</a:t>
             </a:fld>
             <a:endParaRPr lang="en-US"/>
           </a:p>
@@ -7128,13 +7061,6 @@
   <p:transition>
     <p:fade/>
   </p:transition>
-  <p:timing>
-    <p:tnLst>
-      <p:par>
-        <p:cTn id="1" dur="indefinite" restart="never" nodeType="tmRoot"/>
-      </p:par>
-    </p:tnLst>
-  </p:timing>
 </p:sldLayout>
 </file>
 
@@ -7685,7 +7611,7 @@
           <a:p>
             <a:fld id="{5958763E-B898-436D-883D-03711491D54A}" type="datetimeFigureOut">
               <a:rPr lang="en-US" smtClean="0"/>
-              <a:t>3/26/2020</a:t>
+              <a:t>9/6/2022</a:t>
             </a:fld>
             <a:endParaRPr lang="en-US"/>
           </a:p>
@@ -7746,13 +7672,6 @@
   <p:transition>
     <p:fade/>
   </p:transition>
-  <p:timing>
-    <p:tnLst>
-      <p:par>
-        <p:cTn id="1" dur="indefinite" restart="never" nodeType="tmRoot"/>
-      </p:par>
-    </p:tnLst>
-  </p:timing>
 </p:sldLayout>
 </file>
 
@@ -8463,7 +8382,7 @@
           <a:p>
             <a:fld id="{5958763E-B898-436D-883D-03711491D54A}" type="datetimeFigureOut">
               <a:rPr lang="en-US" smtClean="0"/>
-              <a:t>3/26/2020</a:t>
+              <a:t>9/6/2022</a:t>
             </a:fld>
             <a:endParaRPr lang="en-US"/>
           </a:p>
@@ -8524,13 +8443,6 @@
   <p:transition>
     <p:fade/>
   </p:transition>
-  <p:timing>
-    <p:tnLst>
-      <p:par>
-        <p:cTn id="1" dur="indefinite" restart="never" nodeType="tmRoot"/>
-      </p:par>
-    </p:tnLst>
-  </p:timing>
 </p:sldLayout>
 </file>
 
@@ -8574,7 +8486,7 @@
           <a:p>
             <a:fld id="{5958763E-B898-436D-883D-03711491D54A}" type="datetimeFigureOut">
               <a:rPr lang="en-US" smtClean="0"/>
-              <a:t>3/26/2020</a:t>
+              <a:t>9/6/2022</a:t>
             </a:fld>
             <a:endParaRPr lang="en-US"/>
           </a:p>
@@ -8647,13 +8559,6 @@
   <p:transition>
     <p:fade/>
   </p:transition>
-  <p:timing>
-    <p:tnLst>
-      <p:par>
-        <p:cTn id="1" dur="indefinite" restart="never" nodeType="tmRoot"/>
-      </p:par>
-    </p:tnLst>
-  </p:timing>
 </p:sldLayout>
 </file>
 
@@ -8733,7 +8638,7 @@
                 <a:spcPct val="0"/>
               </a:spcAft>
             </a:pPr>
-            <a:endParaRPr lang="en-US" sz="2400" dirty="0" err="1" smtClean="0">
+            <a:endParaRPr lang="en-US" sz="2400" dirty="0" err="1">
               <a:gradFill>
                 <a:gsLst>
                   <a:gs pos="0">
@@ -8866,15 +8771,7 @@
           <a:p>
             <a:r>
               <a:rPr lang="en-US" dirty="0"/>
-              <a:t>Click to edit Master </a:t>
-            </a:r>
-            <a:r>
-              <a:rPr lang="en-US" dirty="0" smtClean="0"/>
-              <a:t>subtitle </a:t>
-            </a:r>
-            <a:r>
-              <a:rPr lang="en-US" dirty="0"/>
-              <a:t>style</a:t>
+              <a:t>Click to edit Master subtitle style</a:t>
             </a:r>
           </a:p>
         </p:txBody>
@@ -8916,7 +8813,7 @@
             <a:fld id="{1C2D31DE-C454-491C-B5C3-F097855E3DF7}" type="datetime4">
               <a:rPr lang="en-US" smtClean="0"/>
               <a:pPr/>
-              <a:t>March 26, 2020</a:t>
+              <a:t>September 6, 2022</a:t>
             </a:fld>
             <a:endParaRPr lang="en-US" dirty="0"/>
           </a:p>
@@ -11990,17 +11887,16 @@
           <a:p>
             <a:pPr lvl="0"/>
             <a:r>
-              <a:rPr lang="en-US" dirty="0" smtClean="0"/>
+              <a:rPr lang="en-US" dirty="0"/>
               <a:t>Presenter Name</a:t>
             </a:r>
             <a:br>
-              <a:rPr lang="en-US" dirty="0" smtClean="0"/>
+              <a:rPr lang="en-US" dirty="0"/>
             </a:br>
             <a:r>
-              <a:rPr lang="en-US" dirty="0" smtClean="0"/>
+              <a:rPr lang="en-US" dirty="0"/>
               <a:t>Presenter Title</a:t>
             </a:r>
-            <a:endParaRPr lang="en-US" dirty="0"/>
           </a:p>
         </p:txBody>
       </p:sp>
@@ -12017,13 +11913,6 @@
   <p:transition>
     <p:fade/>
   </p:transition>
-  <p:timing>
-    <p:tnLst>
-      <p:par>
-        <p:cTn id="1" dur="indefinite" restart="never" nodeType="tmRoot"/>
-      </p:par>
-    </p:tnLst>
-  </p:timing>
   <p:hf sldNum="0" hdr="0" ftr="0"/>
 </p:sldLayout>
 </file>
@@ -12076,7 +11965,7 @@
           <a:p>
             <a:fld id="{5958763E-B898-436D-883D-03711491D54A}" type="datetimeFigureOut">
               <a:rPr lang="en-US" smtClean="0"/>
-              <a:t>3/26/2020</a:t>
+              <a:t>9/6/2022</a:t>
             </a:fld>
             <a:endParaRPr lang="en-US"/>
           </a:p>
@@ -12149,13 +12038,6 @@
   <p:transition>
     <p:fade/>
   </p:transition>
-  <p:timing>
-    <p:tnLst>
-      <p:par>
-        <p:cTn id="1" dur="indefinite" restart="never" nodeType="tmRoot"/>
-      </p:par>
-    </p:tnLst>
-  </p:timing>
 </p:sldLayout>
 </file>
 
@@ -12207,7 +12089,7 @@
           <a:p>
             <a:fld id="{5958763E-B898-436D-883D-03711491D54A}" type="datetimeFigureOut">
               <a:rPr lang="en-US" smtClean="0"/>
-              <a:t>3/26/2020</a:t>
+              <a:t>9/6/2022</a:t>
             </a:fld>
             <a:endParaRPr lang="en-US"/>
           </a:p>
@@ -12280,13 +12162,6 @@
   <p:transition>
     <p:fade/>
   </p:transition>
-  <p:timing>
-    <p:tnLst>
-      <p:par>
-        <p:cTn id="1" dur="indefinite" restart="never" nodeType="tmRoot"/>
-      </p:par>
-    </p:tnLst>
-  </p:timing>
 </p:sldLayout>
 </file>
 
@@ -12338,7 +12213,7 @@
           <a:p>
             <a:fld id="{5958763E-B898-436D-883D-03711491D54A}" type="datetimeFigureOut">
               <a:rPr lang="en-US" smtClean="0"/>
-              <a:t>3/26/2020</a:t>
+              <a:t>9/6/2022</a:t>
             </a:fld>
             <a:endParaRPr lang="en-US"/>
           </a:p>
@@ -12411,13 +12286,6 @@
   <p:transition>
     <p:fade/>
   </p:transition>
-  <p:timing>
-    <p:tnLst>
-      <p:par>
-        <p:cTn id="1" dur="indefinite" restart="never" nodeType="tmRoot"/>
-      </p:par>
-    </p:tnLst>
-  </p:timing>
 </p:sldLayout>
 </file>
 
@@ -12469,7 +12337,7 @@
           <a:p>
             <a:fld id="{5958763E-B898-436D-883D-03711491D54A}" type="datetimeFigureOut">
               <a:rPr lang="en-US" smtClean="0"/>
-              <a:t>3/26/2020</a:t>
+              <a:t>9/6/2022</a:t>
             </a:fld>
             <a:endParaRPr lang="en-US"/>
           </a:p>
@@ -12542,13 +12410,6 @@
   <p:transition>
     <p:fade/>
   </p:transition>
-  <p:timing>
-    <p:tnLst>
-      <p:par>
-        <p:cTn id="1" dur="indefinite" restart="never" nodeType="tmRoot"/>
-      </p:par>
-    </p:tnLst>
-  </p:timing>
 </p:sldLayout>
 </file>
 
@@ -12600,7 +12461,7 @@
           <a:p>
             <a:fld id="{5958763E-B898-436D-883D-03711491D54A}" type="datetimeFigureOut">
               <a:rPr lang="en-US" smtClean="0"/>
-              <a:t>3/26/2020</a:t>
+              <a:t>9/6/2022</a:t>
             </a:fld>
             <a:endParaRPr lang="en-US"/>
           </a:p>
@@ -12673,13 +12534,6 @@
   <p:transition>
     <p:fade/>
   </p:transition>
-  <p:timing>
-    <p:tnLst>
-      <p:par>
-        <p:cTn id="1" dur="indefinite" restart="never" nodeType="tmRoot"/>
-      </p:par>
-    </p:tnLst>
-  </p:timing>
 </p:sldLayout>
 </file>
 
@@ -12731,7 +12585,7 @@
           <a:p>
             <a:fld id="{5958763E-B898-436D-883D-03711491D54A}" type="datetimeFigureOut">
               <a:rPr lang="en-US" smtClean="0"/>
-              <a:t>3/26/2020</a:t>
+              <a:t>9/6/2022</a:t>
             </a:fld>
             <a:endParaRPr lang="en-US"/>
           </a:p>
@@ -12804,13 +12658,6 @@
   <p:transition>
     <p:fade/>
   </p:transition>
-  <p:timing>
-    <p:tnLst>
-      <p:par>
-        <p:cTn id="1" dur="indefinite" restart="never" nodeType="tmRoot"/>
-      </p:par>
-    </p:tnLst>
-  </p:timing>
 </p:sldLayout>
 </file>
 
@@ -12862,7 +12709,7 @@
           <a:p>
             <a:fld id="{5958763E-B898-436D-883D-03711491D54A}" type="datetimeFigureOut">
               <a:rPr lang="en-US" smtClean="0"/>
-              <a:t>3/26/2020</a:t>
+              <a:t>9/6/2022</a:t>
             </a:fld>
             <a:endParaRPr lang="en-US"/>
           </a:p>
@@ -12935,13 +12782,6 @@
   <p:transition>
     <p:fade/>
   </p:transition>
-  <p:timing>
-    <p:tnLst>
-      <p:par>
-        <p:cTn id="1" dur="indefinite" restart="never" nodeType="tmRoot"/>
-      </p:par>
-    </p:tnLst>
-  </p:timing>
 </p:sldLayout>
 </file>
 
@@ -12993,7 +12833,7 @@
           <a:p>
             <a:fld id="{5958763E-B898-436D-883D-03711491D54A}" type="datetimeFigureOut">
               <a:rPr lang="en-US" smtClean="0"/>
-              <a:t>3/26/2020</a:t>
+              <a:t>9/6/2022</a:t>
             </a:fld>
             <a:endParaRPr lang="en-US"/>
           </a:p>
@@ -13066,13 +12906,6 @@
   <p:transition>
     <p:fade/>
   </p:transition>
-  <p:timing>
-    <p:tnLst>
-      <p:par>
-        <p:cTn id="1" dur="indefinite" restart="never" nodeType="tmRoot"/>
-      </p:par>
-    </p:tnLst>
-  </p:timing>
 </p:sldLayout>
 </file>
 
@@ -13133,7 +12966,7 @@
           <a:p>
             <a:fld id="{5958763E-B898-436D-883D-03711491D54A}" type="datetimeFigureOut">
               <a:rPr lang="en-US" smtClean="0"/>
-              <a:t>3/26/2020</a:t>
+              <a:t>9/6/2022</a:t>
             </a:fld>
             <a:endParaRPr lang="en-US"/>
           </a:p>
@@ -13206,13 +13039,6 @@
   <p:transition>
     <p:fade/>
   </p:transition>
-  <p:timing>
-    <p:tnLst>
-      <p:par>
-        <p:cTn id="1" dur="indefinite" restart="never" nodeType="tmRoot"/>
-      </p:par>
-    </p:tnLst>
-  </p:timing>
 </p:sldLayout>
 </file>
 
@@ -16214,13 +16040,6 @@
   <p:transition>
     <p:fade/>
   </p:transition>
-  <p:timing>
-    <p:tnLst>
-      <p:par>
-        <p:cTn id="1" dur="indefinite" restart="never" nodeType="tmRoot"/>
-      </p:par>
-    </p:tnLst>
-  </p:timing>
 </p:sldLayout>
 </file>
 
@@ -16308,7 +16127,7 @@
                 <a:spcPct val="0"/>
               </a:spcAft>
             </a:pPr>
-            <a:endParaRPr lang="en-US" sz="2400" dirty="0" err="1" smtClean="0">
+            <a:endParaRPr lang="en-US" sz="2400" dirty="0" err="1">
               <a:gradFill>
                 <a:gsLst>
                   <a:gs pos="0">
@@ -16444,15 +16263,7 @@
           <a:p>
             <a:r>
               <a:rPr lang="en-US" dirty="0"/>
-              <a:t>Click to edit Master </a:t>
-            </a:r>
-            <a:r>
-              <a:rPr lang="en-US" dirty="0" smtClean="0"/>
-              <a:t>subtitle </a:t>
-            </a:r>
-            <a:r>
-              <a:rPr lang="en-US" dirty="0"/>
-              <a:t>style</a:t>
+              <a:t>Click to edit Master subtitle style</a:t>
             </a:r>
           </a:p>
         </p:txBody>
@@ -16494,7 +16305,7 @@
             <a:fld id="{1C2D31DE-C454-491C-B5C3-F097855E3DF7}" type="datetime4">
               <a:rPr lang="en-US" smtClean="0"/>
               <a:pPr/>
-              <a:t>March 26, 2020</a:t>
+              <a:t>September 6, 2022</a:t>
             </a:fld>
             <a:endParaRPr lang="en-US" dirty="0"/>
           </a:p>
@@ -19576,17 +19387,16 @@
           <a:p>
             <a:pPr lvl="0"/>
             <a:r>
-              <a:rPr lang="en-US" dirty="0" smtClean="0"/>
+              <a:rPr lang="en-US" dirty="0"/>
               <a:t>Presenter Name</a:t>
             </a:r>
             <a:br>
-              <a:rPr lang="en-US" dirty="0" smtClean="0"/>
+              <a:rPr lang="en-US" dirty="0"/>
             </a:br>
             <a:r>
-              <a:rPr lang="en-US" dirty="0" smtClean="0"/>
+              <a:rPr lang="en-US" dirty="0"/>
               <a:t>Presenter Title</a:t>
             </a:r>
-            <a:endParaRPr lang="en-US" dirty="0"/>
           </a:p>
         </p:txBody>
       </p:sp>
@@ -19603,13 +19413,6 @@
   <p:transition>
     <p:fade/>
   </p:transition>
-  <p:timing>
-    <p:tnLst>
-      <p:par>
-        <p:cTn id="1" dur="indefinite" restart="never" nodeType="tmRoot"/>
-      </p:par>
-    </p:tnLst>
-  </p:timing>
   <p:hf sldNum="0" hdr="0" ftr="0"/>
 </p:sldLayout>
 </file>
@@ -27119,10 +26922,9 @@
           <a:p>
             <a:pPr lvl="0"/>
             <a:r>
-              <a:rPr lang="en-US" dirty="0" smtClean="0"/>
+              <a:rPr lang="en-US" dirty="0"/>
               <a:t>&lt;Call to action&gt;</a:t>
             </a:r>
-            <a:endParaRPr lang="en-US" dirty="0"/>
           </a:p>
         </p:txBody>
       </p:sp>
@@ -28739,7 +28541,7 @@
           <a:p>
             <a:fld id="{5958763E-B898-436D-883D-03711491D54A}" type="datetimeFigureOut">
               <a:rPr lang="en-US" smtClean="0"/>
-              <a:t>3/26/2020</a:t>
+              <a:t>9/6/2022</a:t>
             </a:fld>
             <a:endParaRPr lang="en-US"/>
           </a:p>
@@ -28866,7 +28668,7 @@
                 <a:spcPct val="0"/>
               </a:spcAft>
             </a:pPr>
-            <a:endParaRPr lang="en-US" sz="2400" dirty="0" err="1" smtClean="0">
+            <a:endParaRPr lang="en-US" sz="2400" dirty="0" err="1">
               <a:gradFill>
                 <a:gsLst>
                   <a:gs pos="0">
@@ -28897,13 +28699,6 @@
   <p:transition>
     <p:fade/>
   </p:transition>
-  <p:timing>
-    <p:tnLst>
-      <p:par>
-        <p:cTn id="1" dur="indefinite" restart="never" nodeType="tmRoot"/>
-      </p:par>
-    </p:tnLst>
-  </p:timing>
 </p:sldLayout>
 </file>
 
@@ -29148,7 +28943,7 @@
           <a:p>
             <a:fld id="{5958763E-B898-436D-883D-03711491D54A}" type="datetimeFigureOut">
               <a:rPr lang="en-US" smtClean="0"/>
-              <a:t>3/26/2020</a:t>
+              <a:t>9/6/2022</a:t>
             </a:fld>
             <a:endParaRPr lang="en-US"/>
           </a:p>
@@ -29221,13 +29016,6 @@
   <p:transition>
     <p:fade/>
   </p:transition>
-  <p:timing>
-    <p:tnLst>
-      <p:par>
-        <p:cTn id="1" dur="indefinite" restart="never" nodeType="tmRoot"/>
-      </p:par>
-    </p:tnLst>
-  </p:timing>
 </p:sldLayout>
 </file>
 
@@ -29449,7 +29237,7 @@
           <a:p>
             <a:fld id="{5958763E-B898-436D-883D-03711491D54A}" type="datetimeFigureOut">
               <a:rPr lang="en-US" smtClean="0"/>
-              <a:t>3/26/2020</a:t>
+              <a:t>9/6/2022</a:t>
             </a:fld>
             <a:endParaRPr lang="en-US"/>
           </a:p>
@@ -29522,13 +29310,6 @@
   <p:transition>
     <p:fade/>
   </p:transition>
-  <p:timing>
-    <p:tnLst>
-      <p:par>
-        <p:cTn id="1" dur="indefinite" restart="never" nodeType="tmRoot"/>
-      </p:par>
-    </p:tnLst>
-  </p:timing>
 </p:sldLayout>
 </file>
 
@@ -29657,7 +29438,7 @@
           <a:p>
             <a:fld id="{5958763E-B898-436D-883D-03711491D54A}" type="datetimeFigureOut">
               <a:rPr lang="en-US" smtClean="0"/>
-              <a:t>3/26/2020</a:t>
+              <a:t>9/6/2022</a:t>
             </a:fld>
             <a:endParaRPr lang="en-US"/>
           </a:p>
@@ -29780,13 +29561,6 @@
   <p:transition>
     <p:fade/>
   </p:transition>
-  <p:timing>
-    <p:tnLst>
-      <p:par>
-        <p:cTn id="1" dur="indefinite" restart="never" nodeType="tmRoot"/>
-      </p:par>
-    </p:tnLst>
-  </p:timing>
 </p:sldLayout>
 </file>
 
@@ -29925,7 +29699,7 @@
           <a:p>
             <a:fld id="{5958763E-B898-436D-883D-03711491D54A}" type="datetimeFigureOut">
               <a:rPr lang="en-US" smtClean="0"/>
-              <a:t>3/26/2020</a:t>
+              <a:t>9/6/2022</a:t>
             </a:fld>
             <a:endParaRPr lang="en-US"/>
           </a:p>
@@ -30052,13 +29826,6 @@
   <p:transition>
     <p:fade/>
   </p:transition>
-  <p:timing>
-    <p:tnLst>
-      <p:par>
-        <p:cTn id="1" dur="indefinite" restart="never" nodeType="tmRoot"/>
-      </p:par>
-    </p:tnLst>
-  </p:timing>
 </p:sldLayout>
 </file>
 
@@ -30220,7 +29987,7 @@
                 <a:spcPct val="0"/>
               </a:spcAft>
             </a:pPr>
-            <a:endParaRPr lang="en-US" sz="2400" dirty="0" err="1" smtClean="0">
+            <a:endParaRPr lang="en-US" sz="2400" dirty="0" err="1">
               <a:gradFill>
                 <a:gsLst>
                   <a:gs pos="0">
@@ -30271,10 +30038,9 @@
           </a:lstStyle>
           <a:p>
             <a:r>
-              <a:rPr lang="en-US" dirty="0" smtClean="0"/>
+              <a:rPr lang="en-US" dirty="0"/>
               <a:t>Type “Agenda”</a:t>
             </a:r>
-            <a:endParaRPr lang="en-US" dirty="0"/>
           </a:p>
         </p:txBody>
       </p:sp>
@@ -30398,24 +30164,23 @@
           <a:p>
             <a:pPr lvl="0"/>
             <a:r>
-              <a:rPr lang="en-US" dirty="0" smtClean="0"/>
+              <a:rPr lang="en-US" dirty="0"/>
               <a:t>Item 1</a:t>
             </a:r>
           </a:p>
           <a:p>
             <a:pPr lvl="0"/>
             <a:r>
-              <a:rPr lang="en-US" dirty="0" smtClean="0"/>
+              <a:rPr lang="en-US" dirty="0"/>
               <a:t>Item 2</a:t>
             </a:r>
           </a:p>
           <a:p>
             <a:pPr lvl="0"/>
             <a:r>
-              <a:rPr lang="en-US" dirty="0" smtClean="0"/>
+              <a:rPr lang="en-US" dirty="0"/>
               <a:t>Item 3</a:t>
             </a:r>
-            <a:endParaRPr lang="en-US" dirty="0"/>
           </a:p>
         </p:txBody>
       </p:sp>
@@ -30442,7 +30207,7 @@
           <a:p>
             <a:fld id="{5958763E-B898-436D-883D-03711491D54A}" type="datetimeFigureOut">
               <a:rPr lang="en-US" smtClean="0"/>
-              <a:t>3/26/2020</a:t>
+              <a:t>9/6/2022</a:t>
             </a:fld>
             <a:endParaRPr lang="en-US"/>
           </a:p>
@@ -30549,13 +30314,6 @@
   <p:transition>
     <p:fade/>
   </p:transition>
-  <p:timing>
-    <p:tnLst>
-      <p:par>
-        <p:cTn id="1" dur="indefinite" restart="never" nodeType="tmRoot"/>
-      </p:par>
-    </p:tnLst>
-  </p:timing>
 </p:sldLayout>
 </file>
 
@@ -30717,7 +30475,7 @@
                 <a:spcPct val="0"/>
               </a:spcAft>
             </a:pPr>
-            <a:endParaRPr lang="en-US" sz="2400" dirty="0" err="1" smtClean="0">
+            <a:endParaRPr lang="en-US" sz="2400" dirty="0" err="1">
               <a:gradFill>
                 <a:gsLst>
                   <a:gs pos="0">
@@ -30770,10 +30528,9 @@
           </a:lstStyle>
           <a:p>
             <a:r>
-              <a:rPr lang="en-US" dirty="0" smtClean="0"/>
+              <a:rPr lang="en-US" dirty="0"/>
               <a:t>Notable Quote</a:t>
             </a:r>
-            <a:endParaRPr lang="en-US" dirty="0"/>
           </a:p>
         </p:txBody>
       </p:sp>
@@ -30900,10 +30657,9 @@
           <a:p>
             <a:pPr lvl="0"/>
             <a:r>
-              <a:rPr lang="en-US" dirty="0" smtClean="0"/>
+              <a:rPr lang="en-US" dirty="0"/>
               <a:t>– Attribution</a:t>
             </a:r>
-            <a:endParaRPr lang="en-US" dirty="0"/>
           </a:p>
         </p:txBody>
       </p:sp>
@@ -30930,7 +30686,7 @@
           <a:p>
             <a:fld id="{5958763E-B898-436D-883D-03711491D54A}" type="datetimeFigureOut">
               <a:rPr lang="en-US" smtClean="0"/>
-              <a:t>3/26/2020</a:t>
+              <a:t>9/6/2022</a:t>
             </a:fld>
             <a:endParaRPr lang="en-US"/>
           </a:p>
@@ -31678,13 +31434,6 @@
   <p:transition>
     <p:fade/>
   </p:transition>
-  <p:timing>
-    <p:tnLst>
-      <p:par>
-        <p:cTn id="1" dur="indefinite" restart="never" nodeType="tmRoot"/>
-      </p:par>
-    </p:tnLst>
-  </p:timing>
 </p:sldLayout>
 </file>
 
@@ -31756,7 +31505,7 @@
           <a:p>
             <a:fld id="{5958763E-B898-436D-883D-03711491D54A}" type="datetimeFigureOut">
               <a:rPr lang="en-US" smtClean="0"/>
-              <a:t>3/26/2020</a:t>
+              <a:t>9/6/2022</a:t>
             </a:fld>
             <a:endParaRPr lang="en-US"/>
           </a:p>
@@ -31829,13 +31578,6 @@
   <p:transition>
     <p:fade/>
   </p:transition>
-  <p:timing>
-    <p:tnLst>
-      <p:par>
-        <p:cTn id="1" dur="indefinite" restart="never" nodeType="tmRoot"/>
-      </p:par>
-    </p:tnLst>
-  </p:timing>
 </p:sldLayout>
 </file>
 
@@ -31964,7 +31706,7 @@
           <a:p>
             <a:fld id="{5958763E-B898-436D-883D-03711491D54A}" type="datetimeFigureOut">
               <a:rPr lang="en-US" smtClean="0"/>
-              <a:t>3/26/2020</a:t>
+              <a:t>9/6/2022</a:t>
             </a:fld>
             <a:endParaRPr lang="en-US"/>
           </a:p>
@@ -32087,13 +31829,6 @@
   <p:transition>
     <p:fade/>
   </p:transition>
-  <p:timing>
-    <p:tnLst>
-      <p:par>
-        <p:cTn id="1" dur="indefinite" restart="never" nodeType="tmRoot"/>
-      </p:par>
-    </p:tnLst>
-  </p:timing>
 </p:sldLayout>
 </file>
 
@@ -32306,7 +32041,7 @@
           <a:p>
             <a:fld id="{5958763E-B898-436D-883D-03711491D54A}" type="datetimeFigureOut">
               <a:rPr lang="en-US" smtClean="0"/>
-              <a:t>3/26/2020</a:t>
+              <a:t>9/6/2022</a:t>
             </a:fld>
             <a:endParaRPr lang="en-US"/>
           </a:p>
@@ -32379,13 +32114,6 @@
   <p:transition>
     <p:fade/>
   </p:transition>
-  <p:timing>
-    <p:tnLst>
-      <p:par>
-        <p:cTn id="1" dur="indefinite" restart="never" nodeType="tmRoot"/>
-      </p:par>
-    </p:tnLst>
-  </p:timing>
 </p:sldLayout>
 </file>
 
@@ -32543,7 +32271,7 @@
           <a:p>
             <a:fld id="{5958763E-B898-436D-883D-03711491D54A}" type="datetimeFigureOut">
               <a:rPr lang="en-US" smtClean="0"/>
-              <a:t>3/26/2020</a:t>
+              <a:t>9/6/2022</a:t>
             </a:fld>
             <a:endParaRPr lang="en-US"/>
           </a:p>
@@ -32616,13 +32344,6 @@
   <p:transition>
     <p:fade/>
   </p:transition>
-  <p:timing>
-    <p:tnLst>
-      <p:par>
-        <p:cTn id="1" dur="indefinite" restart="never" nodeType="tmRoot"/>
-      </p:par>
-    </p:tnLst>
-  </p:timing>
 </p:sldLayout>
 </file>
 
@@ -32794,7 +32515,7 @@
           <a:p>
             <a:fld id="{5958763E-B898-436D-883D-03711491D54A}" type="datetimeFigureOut">
               <a:rPr lang="en-US" smtClean="0"/>
-              <a:t>3/26/2020</a:t>
+              <a:t>9/6/2022</a:t>
             </a:fld>
             <a:endParaRPr lang="en-US"/>
           </a:p>
@@ -32940,13 +32661,6 @@
   <p:transition>
     <p:fade/>
   </p:transition>
-  <p:timing>
-    <p:tnLst>
-      <p:par>
-        <p:cTn id="1" dur="indefinite" restart="never" nodeType="tmRoot"/>
-      </p:par>
-    </p:tnLst>
-  </p:timing>
   <p:txStyles>
     <p:titleStyle>
       <a:lvl1pPr algn="l" defTabSz="914400" rtl="0" eaLnBrk="1" latinLnBrk="0" hangingPunct="1">
@@ -33251,7 +32965,7 @@
       </a:lvl9pPr>
     </p:otherStyle>
   </p:txStyles>
-  <p:extLst mod="1">
+  <p:extLst>
     <p:ext uri="{27BBF7A9-308A-43DC-89C8-2F10F3537804}">
       <p15:sldGuideLst xmlns:p15="http://schemas.microsoft.com/office/powerpoint/2012/main">
         <p15:guide id="1" orient="horz" pos="2160" userDrawn="1">
@@ -33330,10 +33044,9 @@
           <a:lstStyle/>
           <a:p>
             <a:r>
-              <a:rPr lang="en-US" sz="6600" dirty="0" smtClean="0"/>
+              <a:rPr lang="en-US" sz="6600" dirty="0"/>
               <a:t>Introduction to DOM Manipulation</a:t>
             </a:r>
-            <a:endParaRPr lang="en-US" sz="6600" dirty="0"/>
           </a:p>
         </p:txBody>
       </p:sp>
@@ -33358,11 +33071,11 @@
           <a:lstStyle/>
           <a:p>
             <a:r>
-              <a:rPr lang="en-US" dirty="0" smtClean="0"/>
+              <a:rPr lang="en-US" dirty="0"/>
               <a:t>Hy-Tech Club: </a:t>
             </a:r>
             <a:r>
-              <a:rPr lang="en-US" smtClean="0"/>
+              <a:rPr lang="en-US"/>
               <a:t>Web 102</a:t>
             </a:r>
             <a:endParaRPr lang="en-US" dirty="0"/>
@@ -36350,13 +36063,6 @@
   <p:transition>
     <p:fade/>
   </p:transition>
-  <p:timing>
-    <p:tnLst>
-      <p:par>
-        <p:cTn id="1" dur="indefinite" restart="never" nodeType="tmRoot"/>
-      </p:par>
-    </p:tnLst>
-  </p:timing>
 </p:sld>
 </file>
 
@@ -36403,14 +36109,9 @@
           <a:lstStyle/>
           <a:p>
             <a:r>
-              <a:rPr lang="en-US" dirty="0" smtClean="0"/>
-              <a:t>Reading from input </a:t>
+              <a:rPr lang="en-US" dirty="0"/>
+              <a:t>Reading from input example</a:t>
             </a:r>
-            <a:r>
-              <a:rPr lang="en-US" dirty="0" smtClean="0"/>
-              <a:t>example</a:t>
-            </a:r>
-            <a:endParaRPr lang="en-US" dirty="0"/>
           </a:p>
         </p:txBody>
       </p:sp>
@@ -36438,7 +36139,7 @@
               <a:rPr lang="en-US" sz="11500" dirty="0">
                 <a:hlinkClick r:id="rId3"/>
               </a:rPr>
-              <a:t>https://repl.it/repls/PapayawhipRubberyModels</a:t>
+              <a:t>https://replit.com/@HylandOutreach/ReadFromDom</a:t>
             </a:r>
             <a:endParaRPr lang="en-US" sz="13800" dirty="0"/>
           </a:p>
@@ -36457,13 +36158,67 @@
   <p:transition>
     <p:fade/>
   </p:transition>
-  <p:timing>
-    <p:tnLst>
-      <p:par>
-        <p:cTn id="1" dur="indefinite" restart="never" nodeType="tmRoot"/>
-      </p:par>
-    </p:tnLst>
-  </p:timing>
+</p:sld>
+</file>
+
+<file path=ppt/slides/slide11.xml><?xml version="1.0" encoding="utf-8"?>
+<p:sld xmlns:a="http://schemas.openxmlformats.org/drawingml/2006/main" xmlns:r="http://schemas.openxmlformats.org/officeDocument/2006/relationships" xmlns:p="http://schemas.openxmlformats.org/presentationml/2006/main">
+  <p:cSld>
+    <p:spTree>
+      <p:nvGrpSpPr>
+        <p:cNvPr id="1" name=""/>
+        <p:cNvGrpSpPr/>
+        <p:nvPr/>
+      </p:nvGrpSpPr>
+      <p:grpSpPr>
+        <a:xfrm>
+          <a:off x="0" y="0"/>
+          <a:ext cx="0" cy="0"/>
+          <a:chOff x="0" y="0"/>
+          <a:chExt cx="0" cy="0"/>
+        </a:xfrm>
+      </p:grpSpPr>
+      <p:sp>
+        <p:nvSpPr>
+          <p:cNvPr id="2" name="Text Placeholder 1">
+            <a:extLst>
+              <a:ext uri="{FF2B5EF4-FFF2-40B4-BE49-F238E27FC236}">
+                <a16:creationId xmlns:a16="http://schemas.microsoft.com/office/drawing/2014/main" id="{0BD9567A-D911-4354-AEEA-DDA2EF757934}"/>
+              </a:ext>
+            </a:extLst>
+          </p:cNvPr>
+          <p:cNvSpPr>
+            <a:spLocks noGrp="1"/>
+          </p:cNvSpPr>
+          <p:nvPr>
+            <p:ph type="body" sz="quarter" idx="10"/>
+          </p:nvPr>
+        </p:nvSpPr>
+        <p:spPr/>
+        <p:txBody>
+          <a:bodyPr/>
+          <a:lstStyle/>
+          <a:p>
+            <a:r>
+              <a:rPr lang="en-US" dirty="0"/>
+              <a:t>Questions?</a:t>
+            </a:r>
+          </a:p>
+        </p:txBody>
+      </p:sp>
+    </p:spTree>
+    <p:extLst>
+      <p:ext uri="{BB962C8B-B14F-4D97-AF65-F5344CB8AC3E}">
+        <p14:creationId xmlns:p14="http://schemas.microsoft.com/office/powerpoint/2010/main" val="3776173211"/>
+      </p:ext>
+    </p:extLst>
+  </p:cSld>
+  <p:clrMapOvr>
+    <a:masterClrMapping/>
+  </p:clrMapOvr>
+  <p:transition>
+    <p:fade/>
+  </p:transition>
 </p:sld>
 </file>
 
@@ -36500,19 +36255,19 @@
           <a:lstStyle/>
           <a:p>
             <a:r>
-              <a:rPr lang="en-US" dirty="0" smtClean="0"/>
+              <a:rPr lang="en-US" dirty="0"/>
               <a:t>Review: </a:t>
             </a:r>
             <a:r>
-              <a:rPr lang="en-US" dirty="0" err="1" smtClean="0"/>
+              <a:rPr lang="en-US" dirty="0" err="1"/>
               <a:t>Javascript</a:t>
             </a:r>
             <a:r>
-              <a:rPr lang="en-US" dirty="0" smtClean="0"/>
+              <a:rPr lang="en-US" dirty="0"/>
               <a:t> </a:t>
             </a:r>
             <a:r>
-              <a:rPr lang="en-US" sz="4000" cap="none" dirty="0" smtClean="0">
+              <a:rPr lang="en-US" sz="4000" cap="none" dirty="0">
                 <a:solidFill>
                   <a:schemeClr val="accent1">
                     <a:lumMod val="50000"/>
@@ -36523,10 +36278,9 @@
               <a:t>prompt</a:t>
             </a:r>
             <a:r>
-              <a:rPr lang="en-US" dirty="0" smtClean="0"/>
+              <a:rPr lang="en-US" dirty="0"/>
               <a:t>s</a:t>
             </a:r>
-            <a:endParaRPr lang="en-US" dirty="0"/>
           </a:p>
         </p:txBody>
       </p:sp>
@@ -36549,13 +36303,13 @@
               <a:buNone/>
             </a:pPr>
             <a:r>
-              <a:rPr lang="en-US" sz="4400" dirty="0" err="1">
+              <a:rPr lang="en-US" sz="4400" dirty="0">
                 <a:solidFill>
                   <a:srgbClr val="0000FF"/>
                 </a:solidFill>
                 <a:latin typeface="Consolas" panose="020B0609020204030204" pitchFamily="49" charset="0"/>
               </a:rPr>
-              <a:t>var</a:t>
+              <a:t>let</a:t>
             </a:r>
             <a:r>
               <a:rPr lang="en-US" sz="4400" dirty="0">
@@ -36564,19 +36318,10 @@
                 </a:solidFill>
                 <a:latin typeface="Consolas" panose="020B0609020204030204" pitchFamily="49" charset="0"/>
               </a:rPr>
-              <a:t> name = prompt</a:t>
+              <a:t> name = prompt(</a:t>
             </a:r>
             <a:r>
-              <a:rPr lang="en-US" sz="4400" dirty="0" smtClean="0">
-                <a:solidFill>
-                  <a:srgbClr val="000000"/>
-                </a:solidFill>
-                <a:latin typeface="Consolas" panose="020B0609020204030204" pitchFamily="49" charset="0"/>
-              </a:rPr>
-              <a:t>(</a:t>
-            </a:r>
-            <a:r>
-              <a:rPr lang="en-US" sz="4400" dirty="0" smtClean="0">
+              <a:rPr lang="en-US" sz="4400" dirty="0">
                 <a:solidFill>
                   <a:srgbClr val="A31515"/>
                 </a:solidFill>
@@ -36585,7 +36330,7 @@
               <a:t>"Name:"</a:t>
             </a:r>
             <a:r>
-              <a:rPr lang="en-US" sz="4400" dirty="0" smtClean="0">
+              <a:rPr lang="en-US" sz="4400" dirty="0">
                 <a:solidFill>
                   <a:srgbClr val="000000"/>
                 </a:solidFill>
@@ -36595,14 +36340,14 @@
             </a:r>
           </a:p>
           <a:p>
-            <a:endParaRPr lang="en-US" sz="3600" dirty="0" smtClean="0"/>
+            <a:endParaRPr lang="en-US" sz="3600" dirty="0"/>
           </a:p>
           <a:p>
             <a:pPr marL="57150" indent="0">
               <a:buNone/>
             </a:pPr>
             <a:r>
-              <a:rPr lang="en-US" sz="3600" dirty="0" smtClean="0"/>
+              <a:rPr lang="en-US" sz="3600" dirty="0"/>
               <a:t>Prompts make user input easy to receive, but what is wrong with them?</a:t>
             </a:r>
           </a:p>
@@ -36614,10 +36359,9 @@
               <a:buNone/>
             </a:pPr>
             <a:r>
-              <a:rPr lang="en-US" sz="3600" i="1" dirty="0" smtClean="0"/>
+              <a:rPr lang="en-US" sz="3600" i="1" dirty="0"/>
               <a:t>The user experience is not good!</a:t>
             </a:r>
-            <a:endParaRPr lang="en-US" sz="3600" i="1" dirty="0"/>
           </a:p>
           <a:p>
             <a:pPr marL="57150" indent="0">
@@ -36892,10 +36636,9 @@
           <a:lstStyle/>
           <a:p>
             <a:r>
-              <a:rPr lang="en-US" dirty="0" smtClean="0"/>
+              <a:rPr lang="en-US" dirty="0"/>
               <a:t>Review: HTML Forms</a:t>
             </a:r>
-            <a:endParaRPr lang="en-US" dirty="0"/>
           </a:p>
         </p:txBody>
       </p:sp>
@@ -37054,7 +36797,7 @@
                 </a:solidFill>
                 <a:latin typeface="Consolas" panose="020B0609020204030204" pitchFamily="49" charset="0"/>
               </a:rPr>
-              <a:t>&gt;&lt;/p&gt;</a:t>
+              <a:t> /&gt;&lt;/p&gt;</a:t>
             </a:r>
             <a:endParaRPr lang="en-US" sz="3200" dirty="0">
               <a:solidFill>
@@ -37119,7 +36862,7 @@
                 </a:solidFill>
                 <a:latin typeface="Consolas" panose="020B0609020204030204" pitchFamily="49" charset="0"/>
               </a:rPr>
-              <a:t>&gt;</a:t>
+              <a:t> /&gt;</a:t>
             </a:r>
             <a:endParaRPr lang="en-US" sz="3200" dirty="0">
               <a:solidFill>
@@ -37139,31 +36882,22 @@
                 </a:solidFill>
                 <a:latin typeface="Consolas" panose="020B0609020204030204" pitchFamily="49" charset="0"/>
               </a:rPr>
-              <a:t>&lt;/form</a:t>
+              <a:t>&lt;/form&gt;</a:t>
             </a:r>
-            <a:r>
-              <a:rPr lang="en-US" sz="3200" dirty="0" smtClean="0">
-                <a:solidFill>
-                  <a:srgbClr val="800000"/>
-                </a:solidFill>
-                <a:latin typeface="Consolas" panose="020B0609020204030204" pitchFamily="49" charset="0"/>
-              </a:rPr>
-              <a:t>&gt;</a:t>
-            </a:r>
-            <a:endParaRPr lang="en-US" sz="2400" dirty="0" smtClean="0"/>
+            <a:endParaRPr lang="en-US" sz="2400" dirty="0"/>
           </a:p>
           <a:p>
             <a:pPr marL="57150" indent="0">
               <a:buNone/>
             </a:pPr>
-            <a:endParaRPr lang="en-US" sz="3600" dirty="0" smtClean="0"/>
+            <a:endParaRPr lang="en-US" sz="3600" dirty="0"/>
           </a:p>
           <a:p>
             <a:pPr marL="57150" indent="0">
               <a:buNone/>
             </a:pPr>
             <a:r>
-              <a:rPr lang="en-US" dirty="0" smtClean="0"/>
+              <a:rPr lang="en-US" dirty="0"/>
               <a:t>Forms are easy for the user, but where does the data go?</a:t>
             </a:r>
           </a:p>
@@ -37178,7 +36912,7 @@
               <a:buNone/>
             </a:pPr>
             <a:r>
-              <a:rPr lang="en-US" i="1" dirty="0" smtClean="0"/>
+              <a:rPr lang="en-US" i="1" dirty="0"/>
               <a:t>A back-end is required to deal with form submissions.</a:t>
             </a:r>
           </a:p>
@@ -37192,7 +36926,7 @@
             <a:pPr marL="57150" indent="0">
               <a:buNone/>
             </a:pPr>
-            <a:endParaRPr lang="en-US" i="1" dirty="0" smtClean="0"/>
+            <a:endParaRPr lang="en-US" i="1" dirty="0"/>
           </a:p>
         </p:txBody>
       </p:sp>
@@ -37596,19 +37330,11 @@
           <a:p>
             <a:r>
               <a:rPr lang="en-US" b="0" cap="none" dirty="0"/>
-              <a:t>W</a:t>
-            </a:r>
-            <a:r>
-              <a:rPr lang="en-US" b="0" cap="none" dirty="0" smtClean="0"/>
-              <a:t>hat if it were possible to use the values the user enters into HTML inputs directly in JavaScript?</a:t>
+              <a:t>What if it were possible to use the values the user enters into HTML inputs directly in JavaScript?</a:t>
             </a:r>
             <a:br>
-              <a:rPr lang="en-US" b="0" cap="none" dirty="0" smtClean="0"/>
+              <a:rPr lang="en-US" b="0" cap="none" dirty="0"/>
             </a:br>
-            <a:r>
-              <a:rPr lang="en-US" b="0" cap="none" dirty="0"/>
-              <a:t/>
-            </a:r>
             <a:br>
               <a:rPr lang="en-US" b="0" cap="none" dirty="0"/>
             </a:br>
@@ -37647,18 +37373,13 @@
               </a:spcAft>
             </a:pPr>
             <a:r>
-              <a:rPr lang="en-US" sz="6600" b="1" dirty="0" smtClean="0">
+              <a:rPr lang="en-US" sz="6600" b="1" dirty="0">
                 <a:solidFill>
                   <a:schemeClr val="bg1"/>
                 </a:solidFill>
               </a:rPr>
               <a:t>It is!</a:t>
             </a:r>
-            <a:endParaRPr lang="en-US" sz="6600" b="1" dirty="0" smtClean="0">
-              <a:solidFill>
-                <a:schemeClr val="bg1"/>
-              </a:solidFill>
-            </a:endParaRPr>
           </a:p>
         </p:txBody>
       </p:sp>
@@ -37797,10 +37518,9 @@
           <a:lstStyle/>
           <a:p>
             <a:r>
-              <a:rPr lang="en-US" dirty="0" smtClean="0"/>
+              <a:rPr lang="en-US" dirty="0"/>
               <a:t>What is the DOM?</a:t>
             </a:r>
-            <a:endParaRPr lang="en-US" dirty="0"/>
           </a:p>
         </p:txBody>
       </p:sp>
@@ -37825,70 +37545,70 @@
               <a:buNone/>
             </a:pPr>
             <a:r>
-              <a:rPr lang="en-US" sz="4400" b="1" dirty="0" smtClean="0"/>
+              <a:rPr lang="en-US" sz="4400" b="1" dirty="0"/>
               <a:t>D</a:t>
             </a:r>
             <a:r>
-              <a:rPr lang="en-US" sz="4400" dirty="0" smtClean="0"/>
+              <a:rPr lang="en-US" sz="4400" dirty="0"/>
               <a:t>ocument </a:t>
             </a:r>
             <a:r>
-              <a:rPr lang="en-US" sz="4400" b="1" dirty="0" smtClean="0"/>
+              <a:rPr lang="en-US" sz="4400" b="1" dirty="0"/>
               <a:t>O</a:t>
             </a:r>
             <a:r>
-              <a:rPr lang="en-US" sz="4400" dirty="0" smtClean="0"/>
+              <a:rPr lang="en-US" sz="4400" dirty="0"/>
               <a:t>bject </a:t>
             </a:r>
             <a:r>
-              <a:rPr lang="en-US" sz="4400" b="1" dirty="0" smtClean="0"/>
+              <a:rPr lang="en-US" sz="4400" b="1" dirty="0"/>
               <a:t>M</a:t>
             </a:r>
             <a:r>
-              <a:rPr lang="en-US" sz="4400" dirty="0" smtClean="0"/>
+              <a:rPr lang="en-US" sz="4400" dirty="0"/>
               <a:t>odel</a:t>
             </a:r>
           </a:p>
           <a:p>
-            <a:endParaRPr lang="en-US" sz="3200" dirty="0" smtClean="0"/>
+            <a:endParaRPr lang="en-US" sz="3200" dirty="0"/>
           </a:p>
           <a:p>
             <a:r>
-              <a:rPr lang="en-US" sz="3200" dirty="0" smtClean="0"/>
+              <a:rPr lang="en-US" sz="3200" dirty="0"/>
               <a:t>It is a </a:t>
             </a:r>
             <a:r>
-              <a:rPr lang="en-US" sz="3200" i="1" dirty="0" smtClean="0"/>
+              <a:rPr lang="en-US" sz="3200" i="1" dirty="0"/>
               <a:t>programming interface</a:t>
             </a:r>
             <a:r>
-              <a:rPr lang="en-US" sz="3200" dirty="0" smtClean="0"/>
+              <a:rPr lang="en-US" sz="3200" dirty="0"/>
               <a:t> for HTML documents</a:t>
             </a:r>
           </a:p>
           <a:p>
-            <a:endParaRPr lang="en-US" sz="3200" dirty="0" smtClean="0"/>
+            <a:endParaRPr lang="en-US" sz="3200" dirty="0"/>
           </a:p>
           <a:p>
             <a:r>
-              <a:rPr lang="en-US" sz="3200" dirty="0" smtClean="0"/>
+              <a:rPr lang="en-US" sz="3200" dirty="0"/>
               <a:t>Allows programs to change document structure, style, and content on an HTML page</a:t>
             </a:r>
           </a:p>
           <a:p>
-            <a:endParaRPr lang="en-US" sz="3200" dirty="0" smtClean="0"/>
+            <a:endParaRPr lang="en-US" sz="3200" dirty="0"/>
           </a:p>
           <a:p>
             <a:r>
-              <a:rPr lang="en-US" sz="3200" dirty="0" smtClean="0"/>
+              <a:rPr lang="en-US" sz="3200" dirty="0"/>
               <a:t>Uses </a:t>
             </a:r>
             <a:r>
-              <a:rPr lang="en-US" sz="3200" b="1" dirty="0" smtClean="0"/>
+              <a:rPr lang="en-US" sz="3200" b="1" dirty="0"/>
               <a:t>objects</a:t>
             </a:r>
             <a:r>
-              <a:rPr lang="en-US" sz="3200" dirty="0" smtClean="0"/>
+              <a:rPr lang="en-US" sz="3200" dirty="0"/>
               <a:t> to store HTML elements in JavaScript code</a:t>
             </a:r>
             <a:endParaRPr lang="en-US" sz="4000" dirty="0"/>
@@ -38224,11 +37944,11 @@
           <a:lstStyle/>
           <a:p>
             <a:r>
-              <a:rPr lang="en-US" dirty="0" smtClean="0"/>
+              <a:rPr lang="en-US" dirty="0"/>
               <a:t>The </a:t>
             </a:r>
             <a:r>
-              <a:rPr lang="en-US" dirty="0" smtClean="0">
+              <a:rPr lang="en-US" dirty="0">
                 <a:solidFill>
                   <a:schemeClr val="accent1">
                     <a:lumMod val="40000"/>
@@ -38239,10 +37959,9 @@
               <a:t>object</a:t>
             </a:r>
             <a:r>
-              <a:rPr lang="en-US" dirty="0" smtClean="0"/>
+              <a:rPr lang="en-US" dirty="0"/>
               <a:t> data type</a:t>
             </a:r>
-            <a:endParaRPr lang="en-US" dirty="0"/>
           </a:p>
         </p:txBody>
       </p:sp>
@@ -38264,34 +37983,34 @@
           <a:lstStyle/>
           <a:p>
             <a:r>
-              <a:rPr lang="en-US" sz="3600" dirty="0" smtClean="0"/>
+              <a:rPr lang="en-US" sz="3600" dirty="0"/>
               <a:t>What data types exist in JavaScript?</a:t>
             </a:r>
           </a:p>
           <a:p>
             <a:pPr lvl="1"/>
             <a:r>
-              <a:rPr lang="en-US" sz="3200" dirty="0" smtClean="0"/>
+              <a:rPr lang="en-US" sz="3200" dirty="0"/>
               <a:t>Number</a:t>
             </a:r>
           </a:p>
           <a:p>
             <a:pPr lvl="1"/>
             <a:r>
-              <a:rPr lang="en-US" sz="3200" dirty="0" smtClean="0"/>
+              <a:rPr lang="en-US" sz="3200" dirty="0"/>
               <a:t>String</a:t>
             </a:r>
           </a:p>
           <a:p>
             <a:pPr lvl="1"/>
             <a:r>
-              <a:rPr lang="en-US" sz="3200" dirty="0" smtClean="0"/>
+              <a:rPr lang="en-US" sz="3200" dirty="0"/>
               <a:t>Boolean</a:t>
             </a:r>
           </a:p>
           <a:p>
             <a:pPr lvl="1"/>
-            <a:endParaRPr lang="en-US" sz="3200" dirty="0" smtClean="0"/>
+            <a:endParaRPr lang="en-US" sz="3200" dirty="0"/>
           </a:p>
           <a:p>
             <a:pPr lvl="1"/>
@@ -38299,11 +38018,11 @@
           </a:p>
           <a:p>
             <a:r>
-              <a:rPr lang="en-US" sz="3600" b="1" dirty="0" smtClean="0"/>
+              <a:rPr lang="en-US" sz="3600" b="1" dirty="0"/>
               <a:t>Objects</a:t>
             </a:r>
             <a:r>
-              <a:rPr lang="en-US" sz="3600" dirty="0" smtClean="0"/>
+              <a:rPr lang="en-US" sz="3600" dirty="0"/>
               <a:t> are a data type that can store pretty much anything in JavaScript, including HTML elements!</a:t>
             </a:r>
             <a:endParaRPr lang="en-US" sz="3600" b="1" dirty="0"/>
@@ -38753,10 +38472,9 @@
           <a:lstStyle/>
           <a:p>
             <a:r>
-              <a:rPr lang="en-US" dirty="0" smtClean="0"/>
+              <a:rPr lang="en-US" dirty="0"/>
               <a:t>Storing HTML elements in JavaScript</a:t>
             </a:r>
-            <a:endParaRPr lang="en-US" dirty="0"/>
           </a:p>
         </p:txBody>
       </p:sp>
@@ -38825,25 +38543,7 @@
                 </a:solidFill>
                 <a:latin typeface="Consolas" panose="020B0609020204030204" pitchFamily="49" charset="0"/>
               </a:rPr>
-              <a:t>"</a:t>
-            </a:r>
-            <a:r>
-              <a:rPr lang="en-US" sz="4800" dirty="0" err="1">
-                <a:solidFill>
-                  <a:srgbClr val="0000FF"/>
-                </a:solidFill>
-                <a:latin typeface="Consolas" panose="020B0609020204030204" pitchFamily="49" charset="0"/>
-              </a:rPr>
-              <a:t>myInput</a:t>
-            </a:r>
-            <a:r>
-              <a:rPr lang="en-US" sz="4800" dirty="0">
-                <a:solidFill>
-                  <a:srgbClr val="0000FF"/>
-                </a:solidFill>
-                <a:latin typeface="Consolas" panose="020B0609020204030204" pitchFamily="49" charset="0"/>
-              </a:rPr>
-              <a:t>"</a:t>
+              <a:t>"my-input"</a:t>
             </a:r>
             <a:r>
               <a:rPr lang="en-US" sz="4800" dirty="0">
@@ -38852,7 +38552,7 @@
                 </a:solidFill>
                 <a:latin typeface="Consolas" panose="020B0609020204030204" pitchFamily="49" charset="0"/>
               </a:rPr>
-              <a:t>&gt;</a:t>
+              <a:t> /&gt;</a:t>
             </a:r>
             <a:endParaRPr lang="en-US" sz="4800" dirty="0">
               <a:solidFill>
@@ -38865,22 +38565,22 @@
             <a:pPr marL="57150" indent="0">
               <a:buNone/>
             </a:pPr>
-            <a:endParaRPr lang="en-US" dirty="0" smtClean="0"/>
+            <a:endParaRPr lang="en-US" dirty="0"/>
           </a:p>
           <a:p>
             <a:pPr marL="57150" indent="0">
               <a:buNone/>
             </a:pPr>
             <a:r>
-              <a:rPr lang="en-US" sz="3200" dirty="0" smtClean="0"/>
+              <a:rPr lang="en-US" sz="3200" dirty="0"/>
               <a:t>How could a developer </a:t>
             </a:r>
             <a:r>
-              <a:rPr lang="en-US" sz="3200" u="sng" dirty="0" smtClean="0"/>
+              <a:rPr lang="en-US" sz="3200" u="sng" dirty="0"/>
               <a:t>select</a:t>
             </a:r>
             <a:r>
-              <a:rPr lang="en-US" sz="3200" dirty="0" smtClean="0"/>
+              <a:rPr lang="en-US" sz="3200" dirty="0"/>
               <a:t> this element in CSS?</a:t>
             </a:r>
           </a:p>
@@ -38898,7 +38598,7 @@
               <a:t>#</a:t>
             </a:r>
             <a:r>
-              <a:rPr lang="en-US" sz="3200" i="1" dirty="0" err="1" smtClean="0">
+              <a:rPr lang="en-US" sz="3200" i="1" dirty="0" err="1">
                 <a:solidFill>
                   <a:srgbClr val="800000"/>
                 </a:solidFill>
@@ -38906,7 +38606,7 @@
               </a:rPr>
               <a:t>myInput</a:t>
             </a:r>
-            <a:endParaRPr lang="en-US" sz="3200" i="1" dirty="0" smtClean="0">
+            <a:endParaRPr lang="en-US" sz="3200" i="1" dirty="0">
               <a:solidFill>
                 <a:srgbClr val="800000"/>
               </a:solidFill>
@@ -38929,15 +38629,15 @@
               <a:buNone/>
             </a:pPr>
             <a:r>
-              <a:rPr lang="en-US" sz="3200" dirty="0" smtClean="0"/>
+              <a:rPr lang="en-US" sz="3200" dirty="0"/>
               <a:t>It is also possible to </a:t>
             </a:r>
             <a:r>
-              <a:rPr lang="en-US" sz="3200" u="sng" dirty="0" smtClean="0"/>
+              <a:rPr lang="en-US" sz="3200" u="sng" dirty="0"/>
               <a:t>select</a:t>
             </a:r>
             <a:r>
-              <a:rPr lang="en-US" sz="3200" dirty="0" smtClean="0"/>
+              <a:rPr lang="en-US" sz="3200" dirty="0"/>
               <a:t> an HTML element in JavaScript:</a:t>
             </a:r>
             <a:endParaRPr lang="en-US" sz="3200" dirty="0">
@@ -38952,13 +38652,13 @@
               <a:buNone/>
             </a:pPr>
             <a:r>
-              <a:rPr lang="en-US" sz="3200" dirty="0" err="1">
+              <a:rPr lang="en-US" sz="3200" dirty="0">
                 <a:solidFill>
                   <a:srgbClr val="0000FF"/>
                 </a:solidFill>
                 <a:latin typeface="Consolas" panose="020B0609020204030204" pitchFamily="49" charset="0"/>
               </a:rPr>
-              <a:t>var</a:t>
+              <a:t>let</a:t>
             </a:r>
             <a:r>
               <a:rPr lang="en-US" sz="3200" dirty="0">
@@ -38994,25 +38694,7 @@
                 </a:solidFill>
                 <a:latin typeface="Consolas" panose="020B0609020204030204" pitchFamily="49" charset="0"/>
               </a:rPr>
-              <a:t>"#</a:t>
-            </a:r>
-            <a:r>
-              <a:rPr lang="en-US" sz="3200" dirty="0" err="1">
-                <a:solidFill>
-                  <a:srgbClr val="A31515"/>
-                </a:solidFill>
-                <a:latin typeface="Consolas" panose="020B0609020204030204" pitchFamily="49" charset="0"/>
-              </a:rPr>
-              <a:t>myInput</a:t>
-            </a:r>
-            <a:r>
-              <a:rPr lang="en-US" sz="3200" dirty="0">
-                <a:solidFill>
-                  <a:srgbClr val="A31515"/>
-                </a:solidFill>
-                <a:latin typeface="Consolas" panose="020B0609020204030204" pitchFamily="49" charset="0"/>
-              </a:rPr>
-              <a:t>"</a:t>
+              <a:t>"#my-input"</a:t>
             </a:r>
             <a:r>
               <a:rPr lang="en-US" sz="3200" dirty="0">
@@ -39407,7 +39089,7 @@
         <p:spPr>
           <a:xfrm>
             <a:off x="363239" y="1054923"/>
-            <a:ext cx="11328742" cy="646331"/>
+            <a:ext cx="11582017" cy="646331"/>
           </a:xfrm>
           <a:prstGeom prst="rect">
             <a:avLst/>
@@ -39437,7 +39119,7 @@
               <a:defRPr/>
             </a:pPr>
             <a:r>
-              <a:rPr kumimoji="0" lang="en-US" sz="3600" b="0" i="0" u="none" strike="noStrike" kern="1200" cap="none" spc="0" normalizeH="0" baseline="0" noProof="0" dirty="0" err="1">
+              <a:rPr kumimoji="0" lang="en-US" sz="3600" b="0" i="0" u="none" strike="noStrike" kern="1200" cap="none" spc="0" normalizeH="0" baseline="0" noProof="0" dirty="0">
                 <a:ln>
                   <a:noFill/>
                 </a:ln>
@@ -39451,7 +39133,7 @@
                 <a:ea typeface="+mn-ea"/>
                 <a:cs typeface="+mn-cs"/>
               </a:rPr>
-              <a:t>var</a:t>
+              <a:t>let</a:t>
             </a:r>
             <a:r>
               <a:rPr kumimoji="0" lang="en-US" sz="3600" b="0" i="0" u="none" strike="noStrike" kern="1200" cap="none" spc="0" normalizeH="0" baseline="0" noProof="0" dirty="0">
@@ -39519,41 +39201,7 @@
                 <a:ea typeface="+mn-ea"/>
                 <a:cs typeface="+mn-cs"/>
               </a:rPr>
-              <a:t>"#</a:t>
-            </a:r>
-            <a:r>
-              <a:rPr kumimoji="0" lang="en-US" sz="3600" b="0" i="0" u="none" strike="noStrike" kern="1200" cap="none" spc="0" normalizeH="0" baseline="0" noProof="0" dirty="0" err="1">
-                <a:ln>
-                  <a:noFill/>
-                </a:ln>
-                <a:solidFill>
-                  <a:srgbClr val="A31515"/>
-                </a:solidFill>
-                <a:effectLst/>
-                <a:uLnTx/>
-                <a:uFillTx/>
-                <a:latin typeface="Consolas" panose="020B0609020204030204" pitchFamily="49" charset="0"/>
-                <a:ea typeface="+mn-ea"/>
-                <a:cs typeface="+mn-cs"/>
-              </a:rPr>
-              <a:t>myInput</a:t>
-            </a:r>
-            <a:r>
-              <a:rPr kumimoji="0" lang="en-US" sz="3600" b="0" i="0" u="none" strike="noStrike" kern="1200" cap="none" spc="0" normalizeH="0" baseline="0" noProof="0" dirty="0">
-                <a:ln>
-                  <a:noFill/>
-                </a:ln>
-                <a:solidFill>
-                  <a:srgbClr val="A31515"/>
-                </a:solidFill>
-                <a:effectLst/>
-                <a:uLnTx/>
-                <a:uFillTx/>
-                <a:latin typeface="Consolas" panose="020B0609020204030204" pitchFamily="49" charset="0"/>
-                <a:ea typeface="+mn-ea"/>
-                <a:cs typeface="+mn-cs"/>
-              </a:rPr>
-              <a:t>"</a:t>
+              <a:t>"#my-input"</a:t>
             </a:r>
             <a:r>
               <a:rPr kumimoji="0" lang="en-US" sz="3600" b="0" i="0" u="none" strike="noStrike" kern="1200" cap="none" spc="0" normalizeH="0" baseline="0" noProof="0" dirty="0">
@@ -39689,7 +39337,7 @@
               <a:defRPr/>
             </a:pPr>
             <a:r>
-              <a:rPr kumimoji="0" lang="en-US" sz="3200" b="1" i="0" u="none" strike="noStrike" kern="1200" cap="none" spc="0" normalizeH="0" baseline="0" noProof="0" dirty="0" smtClean="0">
+              <a:rPr kumimoji="0" lang="en-US" sz="3200" b="1" i="0" u="none" strike="noStrike" kern="1200" cap="none" spc="0" normalizeH="0" baseline="0" noProof="0" dirty="0">
                 <a:ln>
                   <a:noFill/>
                 </a:ln>
@@ -39709,7 +39357,7 @@
               <a:t>el</a:t>
             </a:r>
             <a:r>
-              <a:rPr kumimoji="0" lang="en-US" sz="3200" b="0" i="0" u="none" strike="noStrike" kern="1200" cap="none" spc="0" normalizeH="0" baseline="0" noProof="0" dirty="0" smtClean="0">
+              <a:rPr kumimoji="0" lang="en-US" sz="3200" b="0" i="0" u="none" strike="noStrike" kern="1200" cap="none" spc="0" normalizeH="0" baseline="0" noProof="0" dirty="0">
                 <a:ln>
                   <a:noFill/>
                 </a:ln>
@@ -39729,7 +39377,7 @@
               <a:t>: variable storing the entire HTML </a:t>
             </a:r>
             <a:r>
-              <a:rPr kumimoji="0" lang="en-US" sz="3200" b="0" i="0" u="none" strike="noStrike" kern="1200" cap="none" spc="0" normalizeH="0" baseline="0" noProof="0" dirty="0" smtClean="0">
+              <a:rPr kumimoji="0" lang="en-US" sz="3200" b="0" i="0" u="none" strike="noStrike" kern="1200" cap="none" spc="0" normalizeH="0" baseline="0" noProof="0" dirty="0">
                 <a:ln>
                   <a:noFill/>
                 </a:ln>
@@ -39749,7 +39397,7 @@
               <a:t>&lt;input&gt;</a:t>
             </a:r>
             <a:r>
-              <a:rPr kumimoji="0" lang="en-US" sz="3200" b="0" i="0" u="none" strike="noStrike" kern="1200" cap="none" spc="0" normalizeH="0" baseline="0" noProof="0" dirty="0" smtClean="0">
+              <a:rPr kumimoji="0" lang="en-US" sz="3200" b="0" i="0" u="none" strike="noStrike" kern="1200" cap="none" spc="0" normalizeH="0" baseline="0" noProof="0" dirty="0">
                 <a:ln>
                   <a:noFill/>
                 </a:ln>
@@ -40010,7 +39658,7 @@
         </p:nvSpPr>
         <p:spPr>
           <a:xfrm>
-            <a:off x="10789920" y="954593"/>
+            <a:off x="11007206" y="954593"/>
             <a:ext cx="720763" cy="823965"/>
           </a:xfrm>
           <a:prstGeom prst="rect">
@@ -40085,7 +39733,7 @@
         <p:spPr>
           <a:xfrm>
             <a:off x="8702937" y="954593"/>
-            <a:ext cx="2086983" cy="823965"/>
+            <a:ext cx="2304269" cy="823965"/>
           </a:xfrm>
           <a:prstGeom prst="rect">
             <a:avLst/>
@@ -40195,7 +39843,7 @@
               <a:defRPr/>
             </a:pPr>
             <a:r>
-              <a:rPr kumimoji="0" lang="en-US" sz="3200" b="1" i="0" u="none" strike="noStrike" kern="1200" cap="none" spc="0" normalizeH="0" baseline="0" noProof="0" dirty="0" smtClean="0">
+              <a:rPr kumimoji="0" lang="en-US" sz="3200" b="1" i="0" u="none" strike="noStrike" kern="1200" cap="none" spc="0" normalizeH="0" baseline="0" noProof="0" dirty="0">
                 <a:ln>
                   <a:noFill/>
                 </a:ln>
@@ -40209,27 +39857,10 @@
                 <a:ea typeface="+mn-ea"/>
                 <a:cs typeface="+mn-cs"/>
               </a:rPr>
-              <a:t>#</a:t>
+              <a:t>#my-input</a:t>
             </a:r>
             <a:r>
-              <a:rPr kumimoji="0" lang="en-US" sz="3200" b="1" i="0" u="none" strike="noStrike" kern="1200" cap="none" spc="0" normalizeH="0" baseline="0" noProof="0" dirty="0" err="1" smtClean="0">
-                <a:ln>
-                  <a:noFill/>
-                </a:ln>
-                <a:solidFill>
-                  <a:srgbClr val="FF7900"/>
-                </a:solidFill>
-                <a:effectLst/>
-                <a:uLnTx/>
-                <a:uFillTx/>
-                <a:latin typeface="Consolas" panose="020B0609020204030204" pitchFamily="49" charset="0"/>
-                <a:ea typeface="+mn-ea"/>
-                <a:cs typeface="+mn-cs"/>
-              </a:rPr>
-              <a:t>myInput</a:t>
-            </a:r>
-            <a:r>
-              <a:rPr kumimoji="0" lang="en-US" sz="3200" b="0" i="0" u="none" strike="noStrike" kern="1200" cap="none" spc="0" normalizeH="0" baseline="0" noProof="0" dirty="0" smtClean="0">
+              <a:rPr kumimoji="0" lang="en-US" sz="3200" b="0" i="0" u="none" strike="noStrike" kern="1200" cap="none" spc="0" normalizeH="0" baseline="0" noProof="0" dirty="0">
                 <a:ln>
                   <a:noFill/>
                 </a:ln>
@@ -40246,7 +39877,7 @@
               <a:t>: </a:t>
             </a:r>
             <a:r>
-              <a:rPr kumimoji="0" lang="en-US" sz="3200" b="0" i="1" u="none" strike="noStrike" kern="1200" cap="none" spc="0" normalizeH="0" baseline="0" noProof="0" dirty="0" smtClean="0">
+              <a:rPr kumimoji="0" lang="en-US" sz="3200" b="0" i="1" u="none" strike="noStrike" kern="1200" cap="none" spc="0" normalizeH="0" baseline="0" noProof="0" dirty="0">
                 <a:ln>
                   <a:noFill/>
                 </a:ln>
@@ -40263,7 +39894,7 @@
               <a:t>selector</a:t>
             </a:r>
             <a:r>
-              <a:rPr kumimoji="0" lang="en-US" sz="3200" b="0" i="0" u="none" strike="noStrike" kern="1200" cap="none" spc="0" normalizeH="0" baseline="0" noProof="0" dirty="0" smtClean="0">
+              <a:rPr kumimoji="0" lang="en-US" sz="3200" b="0" i="0" u="none" strike="noStrike" kern="1200" cap="none" spc="0" normalizeH="0" baseline="0" noProof="0" dirty="0">
                 <a:ln>
                   <a:noFill/>
                 </a:ln>
@@ -40280,7 +39911,7 @@
               <a:t> to tell the </a:t>
             </a:r>
             <a:r>
-              <a:rPr kumimoji="0" lang="en-US" sz="3200" b="0" i="0" u="none" strike="noStrike" kern="1200" cap="none" spc="0" normalizeH="0" baseline="0" noProof="0" dirty="0" err="1" smtClean="0">
+              <a:rPr kumimoji="0" lang="en-US" sz="3200" b="0" i="0" u="none" strike="noStrike" kern="1200" cap="none" spc="0" normalizeH="0" baseline="0" noProof="0" dirty="0" err="1">
                 <a:ln>
                   <a:noFill/>
                 </a:ln>
@@ -40297,7 +39928,7 @@
               <a:t>querySelector</a:t>
             </a:r>
             <a:r>
-              <a:rPr kumimoji="0" lang="en-US" sz="3200" b="0" i="0" u="none" strike="noStrike" kern="1200" cap="none" spc="0" normalizeH="0" baseline="0" noProof="0" dirty="0" smtClean="0">
+              <a:rPr kumimoji="0" lang="en-US" sz="3200" b="0" i="0" u="none" strike="noStrike" kern="1200" cap="none" spc="0" normalizeH="0" baseline="0" noProof="0" dirty="0">
                 <a:ln>
                   <a:noFill/>
                 </a:ln>
@@ -40379,10 +40010,9 @@
           <a:lstStyle/>
           <a:p>
             <a:r>
-              <a:rPr lang="en-US" dirty="0" smtClean="0"/>
+              <a:rPr lang="en-US" dirty="0"/>
               <a:t>Breaking down the example statement</a:t>
             </a:r>
-            <a:endParaRPr lang="en-US" dirty="0"/>
           </a:p>
         </p:txBody>
       </p:sp>
@@ -41039,10 +40669,9 @@
           <a:lstStyle/>
           <a:p>
             <a:r>
-              <a:rPr lang="en-US" dirty="0" smtClean="0"/>
+              <a:rPr lang="en-US" dirty="0"/>
               <a:t>Getting the text value from the user input</a:t>
             </a:r>
-            <a:endParaRPr lang="en-US" dirty="0"/>
           </a:p>
         </p:txBody>
       </p:sp>
@@ -41077,13 +40706,13 @@
               <a:buNone/>
             </a:pPr>
             <a:r>
-              <a:rPr lang="en-US" sz="3600" dirty="0" err="1">
+              <a:rPr lang="en-US" sz="3600" dirty="0">
                 <a:solidFill>
                   <a:srgbClr val="0000FF"/>
                 </a:solidFill>
                 <a:latin typeface="Consolas" panose="020B0609020204030204" pitchFamily="49" charset="0"/>
               </a:rPr>
-              <a:t>var</a:t>
+              <a:t>let</a:t>
             </a:r>
             <a:r>
               <a:rPr lang="en-US" sz="3600" dirty="0">
@@ -41119,25 +40748,7 @@
                 </a:solidFill>
                 <a:latin typeface="Consolas" panose="020B0609020204030204" pitchFamily="49" charset="0"/>
               </a:rPr>
-              <a:t>"#</a:t>
-            </a:r>
-            <a:r>
-              <a:rPr lang="en-US" sz="3600" dirty="0" err="1">
-                <a:solidFill>
-                  <a:srgbClr val="A31515"/>
-                </a:solidFill>
-                <a:latin typeface="Consolas" panose="020B0609020204030204" pitchFamily="49" charset="0"/>
-              </a:rPr>
-              <a:t>myInput</a:t>
-            </a:r>
-            <a:r>
-              <a:rPr lang="en-US" sz="3600" dirty="0">
-                <a:solidFill>
-                  <a:srgbClr val="A31515"/>
-                </a:solidFill>
-                <a:latin typeface="Consolas" panose="020B0609020204030204" pitchFamily="49" charset="0"/>
-              </a:rPr>
-              <a:t>"</a:t>
+              <a:t>"#my-input"</a:t>
             </a:r>
             <a:r>
               <a:rPr lang="en-US" sz="3600" dirty="0">
@@ -41164,13 +40775,13 @@
               <a:buNone/>
             </a:pPr>
             <a:r>
-              <a:rPr lang="en-US" sz="3600" dirty="0" err="1">
+              <a:rPr lang="en-US" sz="3600" dirty="0">
                 <a:solidFill>
                   <a:srgbClr val="0000FF"/>
                 </a:solidFill>
                 <a:latin typeface="Consolas" panose="020B0609020204030204" pitchFamily="49" charset="0"/>
               </a:rPr>
-              <a:t>var</a:t>
+              <a:t>let</a:t>
             </a:r>
             <a:r>
               <a:rPr lang="en-US" sz="3600" dirty="0">
@@ -41222,26 +40833,26 @@
             <a:pPr marL="57150" indent="0">
               <a:buNone/>
             </a:pPr>
-            <a:endParaRPr lang="en-US" dirty="0" smtClean="0"/>
+            <a:endParaRPr lang="en-US" dirty="0"/>
           </a:p>
           <a:p>
             <a:pPr marL="57150" indent="0">
               <a:buNone/>
             </a:pPr>
-            <a:endParaRPr lang="en-US" dirty="0" smtClean="0"/>
+            <a:endParaRPr lang="en-US" dirty="0"/>
           </a:p>
           <a:p>
             <a:pPr marL="57150" indent="0">
               <a:buNone/>
             </a:pPr>
-            <a:endParaRPr lang="en-US" dirty="0" smtClean="0"/>
+            <a:endParaRPr lang="en-US" dirty="0"/>
           </a:p>
           <a:p>
             <a:pPr marL="57150" indent="0">
               <a:buNone/>
             </a:pPr>
             <a:r>
-              <a:rPr lang="en-US" sz="4400" b="1" dirty="0" smtClean="0">
+              <a:rPr lang="en-US" sz="4400" b="1" dirty="0">
                 <a:solidFill>
                   <a:schemeClr val="accent1"/>
                 </a:solidFill>
@@ -41250,7 +40861,7 @@
               <a:t>.value</a:t>
             </a:r>
             <a:r>
-              <a:rPr lang="en-US" sz="3600" dirty="0" smtClean="0"/>
+              <a:rPr lang="en-US" sz="3600" dirty="0"/>
               <a:t> will get the text the user entered into the input</a:t>
             </a:r>
           </a:p>
@@ -41260,14 +40871,10 @@
             </a:pPr>
             <a:r>
               <a:rPr lang="en-US" sz="3600" dirty="0"/>
-              <a:t>I</a:t>
+              <a:t>It will be stored in the </a:t>
             </a:r>
             <a:r>
-              <a:rPr lang="en-US" sz="3600" dirty="0" smtClean="0"/>
-              <a:t>t will be stored in the </a:t>
-            </a:r>
-            <a:r>
-              <a:rPr lang="en-US" sz="4400" b="1" dirty="0" err="1" smtClean="0">
+              <a:rPr lang="en-US" sz="4400" b="1" dirty="0" err="1">
                 <a:solidFill>
                   <a:schemeClr val="accent2"/>
                 </a:solidFill>
@@ -41276,10 +40883,9 @@
               <a:t>elementTextValue</a:t>
             </a:r>
             <a:r>
-              <a:rPr lang="en-US" sz="3600" dirty="0" smtClean="0"/>
+              <a:rPr lang="en-US" sz="3600" dirty="0"/>
               <a:t> variable</a:t>
             </a:r>
-            <a:endParaRPr lang="en-US" sz="3600" dirty="0"/>
           </a:p>
         </p:txBody>
       </p:sp>
@@ -41346,7 +40952,7 @@
                 <a:spcPct val="0"/>
               </a:spcAft>
             </a:pPr>
-            <a:endParaRPr lang="en-US" sz="2400" dirty="0" err="1" smtClean="0">
+            <a:endParaRPr lang="en-US" sz="2400" dirty="0" err="1">
               <a:gradFill>
                 <a:gsLst>
                   <a:gs pos="0">
@@ -41427,7 +41033,7 @@
                 <a:spcPct val="0"/>
               </a:spcAft>
             </a:pPr>
-            <a:endParaRPr lang="en-US" sz="2400" dirty="0" err="1" smtClean="0">
+            <a:endParaRPr lang="en-US" sz="2400" dirty="0" err="1">
               <a:gradFill>
                 <a:gsLst>
                   <a:gs pos="0">

</xml_diff>

<commit_message>
Update gitbook 2022-09-07 14:44:38
</commit_message>
<xml_diff>
--- a/Week06/DomManipulationIntro.pptx
+++ b/Week06/DomManipulationIntro.pptx
@@ -5,7 +5,7 @@
     <p:sldMasterId id="2147483648" r:id="rId1"/>
   </p:sldMasterIdLst>
   <p:notesMasterIdLst>
-    <p:notesMasterId r:id="rId12"/>
+    <p:notesMasterId r:id="rId13"/>
   </p:notesMasterIdLst>
   <p:sldIdLst>
     <p:sldId id="258" r:id="rId2"/>
@@ -18,6 +18,7 @@
     <p:sldId id="314" r:id="rId9"/>
     <p:sldId id="315" r:id="rId10"/>
     <p:sldId id="316" r:id="rId11"/>
+    <p:sldId id="317" r:id="rId12"/>
   </p:sldIdLst>
   <p:sldSz cx="12192000" cy="6858000"/>
   <p:notesSz cx="6858000" cy="9144000"/>
@@ -217,7 +218,7 @@
           <a:p>
             <a:fld id="{19104133-B5B0-4351-8158-4F0E5EB1E2BF}" type="datetimeFigureOut">
               <a:rPr lang="en-US" smtClean="0"/>
-              <a:t>3/26/2020</a:t>
+              <a:t>9/6/2022</a:t>
             </a:fld>
             <a:endParaRPr lang="en-US"/>
           </a:p>
@@ -281,38 +282,37 @@
           <a:p>
             <a:pPr lvl="0"/>
             <a:r>
-              <a:rPr lang="en-US" smtClean="0"/>
+              <a:rPr lang="en-US"/>
               <a:t>Edit Master text styles</a:t>
             </a:r>
           </a:p>
           <a:p>
             <a:pPr lvl="1"/>
             <a:r>
-              <a:rPr lang="en-US" smtClean="0"/>
+              <a:rPr lang="en-US"/>
               <a:t>Second level</a:t>
             </a:r>
           </a:p>
           <a:p>
             <a:pPr lvl="2"/>
             <a:r>
-              <a:rPr lang="en-US" smtClean="0"/>
+              <a:rPr lang="en-US"/>
               <a:t>Third level</a:t>
             </a:r>
           </a:p>
           <a:p>
             <a:pPr lvl="3"/>
             <a:r>
-              <a:rPr lang="en-US" smtClean="0"/>
+              <a:rPr lang="en-US"/>
               <a:t>Fourth level</a:t>
             </a:r>
           </a:p>
           <a:p>
             <a:pPr lvl="4"/>
             <a:r>
-              <a:rPr lang="en-US" smtClean="0"/>
+              <a:rPr lang="en-US"/>
               <a:t>Fifth level</a:t>
             </a:r>
-            <a:endParaRPr lang="en-US"/>
           </a:p>
         </p:txBody>
       </p:sp>
@@ -530,29 +530,29 @@
           <a:lstStyle/>
           <a:p>
             <a:r>
-              <a:rPr lang="en-US" dirty="0" smtClean="0"/>
+              <a:rPr lang="en-US" dirty="0"/>
               <a:t>Ask a student what</a:t>
             </a:r>
             <a:r>
-              <a:rPr lang="en-US" baseline="0" dirty="0" smtClean="0"/>
+              <a:rPr lang="en-US" baseline="0" dirty="0"/>
               <a:t> would happen if the code is run – a dialog box shows up allowing the user to enter a name, stored in the </a:t>
             </a:r>
             <a:r>
-              <a:rPr lang="en-US" b="1" baseline="0" dirty="0" smtClean="0"/>
+              <a:rPr lang="en-US" b="1" baseline="0" dirty="0"/>
               <a:t>name</a:t>
             </a:r>
             <a:r>
-              <a:rPr lang="en-US" b="0" baseline="0" dirty="0" smtClean="0"/>
+              <a:rPr lang="en-US" b="0" baseline="0" dirty="0"/>
               <a:t> variable.</a:t>
             </a:r>
-            <a:endParaRPr lang="en-US" baseline="0" dirty="0" smtClean="0"/>
+            <a:endParaRPr lang="en-US" baseline="0" dirty="0"/>
           </a:p>
           <a:p>
-            <a:endParaRPr lang="en-US" baseline="0" dirty="0" smtClean="0"/>
+            <a:endParaRPr lang="en-US" baseline="0" dirty="0"/>
           </a:p>
           <a:p>
             <a:r>
-              <a:rPr lang="en-US" baseline="0" dirty="0" smtClean="0"/>
+              <a:rPr lang="en-US" baseline="0" dirty="0"/>
               <a:t>Then ask the students what is wrong with prompts – the user experience is bad.</a:t>
             </a:r>
             <a:endParaRPr lang="en-US" dirty="0"/>
@@ -640,20 +640,20 @@
           <a:lstStyle/>
           <a:p>
             <a:r>
-              <a:rPr lang="en-US" dirty="0" smtClean="0"/>
+              <a:rPr lang="en-US" dirty="0"/>
               <a:t>Ask a student how this HTML</a:t>
             </a:r>
             <a:r>
-              <a:rPr lang="en-US" baseline="0" dirty="0" smtClean="0"/>
+              <a:rPr lang="en-US" baseline="0" dirty="0"/>
               <a:t> would render – it would be a form with an input.</a:t>
             </a:r>
           </a:p>
           <a:p>
-            <a:endParaRPr lang="en-US" baseline="0" dirty="0" smtClean="0"/>
+            <a:endParaRPr lang="en-US" baseline="0" dirty="0"/>
           </a:p>
           <a:p>
             <a:r>
-              <a:rPr lang="en-US" baseline="0" dirty="0" smtClean="0"/>
+              <a:rPr lang="en-US" baseline="0" dirty="0"/>
               <a:t>Then ask the students how forms work – a back-end is required to handle submissions.</a:t>
             </a:r>
             <a:endParaRPr lang="en-US" dirty="0"/>
@@ -741,11 +741,11 @@
           <a:lstStyle/>
           <a:p>
             <a:r>
-              <a:rPr lang="en-US" dirty="0" smtClean="0"/>
+              <a:rPr lang="en-US" dirty="0"/>
               <a:t>Ask the students if they can guess what</a:t>
             </a:r>
             <a:r>
-              <a:rPr lang="en-US" baseline="0" dirty="0" smtClean="0"/>
+              <a:rPr lang="en-US" baseline="0" dirty="0"/>
               <a:t> D.O.M. stands for</a:t>
             </a:r>
             <a:endParaRPr lang="en-US" dirty="0"/>
@@ -833,27 +833,27 @@
           <a:lstStyle/>
           <a:p>
             <a:r>
-              <a:rPr lang="en-US" dirty="0" smtClean="0"/>
+              <a:rPr lang="en-US" dirty="0"/>
               <a:t>Ask the students to name the data types that we have covered already – </a:t>
             </a:r>
             <a:r>
-              <a:rPr lang="en-US" b="1" dirty="0" smtClean="0"/>
+              <a:rPr lang="en-US" b="1" dirty="0"/>
               <a:t>number</a:t>
             </a:r>
             <a:r>
-              <a:rPr lang="en-US" b="0" dirty="0" smtClean="0"/>
+              <a:rPr lang="en-US" b="0" dirty="0"/>
               <a:t>, </a:t>
             </a:r>
             <a:r>
-              <a:rPr lang="en-US" b="1" dirty="0" smtClean="0"/>
+              <a:rPr lang="en-US" b="1" dirty="0"/>
               <a:t>string</a:t>
             </a:r>
             <a:r>
-              <a:rPr lang="en-US" b="0" dirty="0" smtClean="0"/>
+              <a:rPr lang="en-US" b="0" dirty="0"/>
               <a:t>, </a:t>
             </a:r>
             <a:r>
-              <a:rPr lang="en-US" b="1" dirty="0" err="1" smtClean="0"/>
+              <a:rPr lang="en-US" b="1" dirty="0" err="1"/>
               <a:t>boolean</a:t>
             </a:r>
             <a:endParaRPr lang="en-US" dirty="0"/>
@@ -941,28 +941,28 @@
           <a:lstStyle/>
           <a:p>
             <a:r>
-              <a:rPr lang="en-US" dirty="0" smtClean="0"/>
+              <a:rPr lang="en-US" dirty="0"/>
               <a:t>Ask the students how to select an HTML element by ID in CSS. Then,</a:t>
             </a:r>
             <a:r>
-              <a:rPr lang="en-US" baseline="0" dirty="0" smtClean="0"/>
+              <a:rPr lang="en-US" baseline="0" dirty="0"/>
               <a:t> show them how it is possible to do the same thing in JavaScript.</a:t>
             </a:r>
           </a:p>
           <a:p>
-            <a:endParaRPr lang="en-US" baseline="0" dirty="0" smtClean="0"/>
+            <a:endParaRPr lang="en-US" baseline="0" dirty="0"/>
           </a:p>
           <a:p>
             <a:r>
-              <a:rPr lang="en-US" baseline="0" dirty="0" smtClean="0"/>
+              <a:rPr lang="en-US" baseline="0" dirty="0"/>
               <a:t>The next slide will break down the statement that uses </a:t>
             </a:r>
             <a:r>
-              <a:rPr lang="en-US" b="1" baseline="0" dirty="0" err="1" smtClean="0"/>
+              <a:rPr lang="en-US" b="1" baseline="0" dirty="0" err="1"/>
               <a:t>document.querySelector</a:t>
             </a:r>
             <a:r>
-              <a:rPr lang="en-US" b="0" baseline="0" dirty="0" smtClean="0"/>
+              <a:rPr lang="en-US" b="0" baseline="0" dirty="0"/>
               <a:t> to take an HTML element and store it in JavaScript.</a:t>
             </a:r>
             <a:endParaRPr lang="en-US" dirty="0"/>
@@ -1050,20 +1050,20 @@
           <a:lstStyle/>
           <a:p>
             <a:r>
-              <a:rPr lang="en-US" dirty="0" smtClean="0"/>
+              <a:rPr lang="en-US" dirty="0"/>
               <a:t>Show how to get the text value from an input.</a:t>
             </a:r>
           </a:p>
           <a:p>
-            <a:endParaRPr lang="en-US" dirty="0" smtClean="0"/>
+            <a:endParaRPr lang="en-US" dirty="0"/>
           </a:p>
           <a:p>
             <a:r>
-              <a:rPr lang="en-US" dirty="0" smtClean="0"/>
+              <a:rPr lang="en-US" dirty="0"/>
               <a:t>Emphasize</a:t>
             </a:r>
             <a:r>
-              <a:rPr lang="en-US" baseline="0" dirty="0" smtClean="0"/>
+              <a:rPr lang="en-US" baseline="0" dirty="0"/>
               <a:t> that this is all the code the students will need to get the value a user has entered in an HTML input, and use it in their JavaScript code. This is mostly boiler-plate, the only things they need to customize are:</a:t>
             </a:r>
           </a:p>
@@ -1073,23 +1073,23 @@
               <a:buChar char="-"/>
             </a:pPr>
             <a:r>
-              <a:rPr lang="en-US" baseline="0" dirty="0" smtClean="0"/>
+              <a:rPr lang="en-US" baseline="0" dirty="0"/>
               <a:t>Variable names (</a:t>
             </a:r>
             <a:r>
-              <a:rPr lang="en-US" b="1" baseline="0" dirty="0" smtClean="0"/>
+              <a:rPr lang="en-US" b="1" baseline="0" dirty="0"/>
               <a:t>el</a:t>
             </a:r>
             <a:r>
-              <a:rPr lang="en-US" b="0" baseline="0" dirty="0" smtClean="0"/>
+              <a:rPr lang="en-US" b="0" baseline="0" dirty="0"/>
               <a:t> and </a:t>
             </a:r>
             <a:r>
-              <a:rPr lang="en-US" b="1" baseline="0" dirty="0" err="1" smtClean="0"/>
+              <a:rPr lang="en-US" b="1" baseline="0" dirty="0" err="1"/>
               <a:t>elementTextValue</a:t>
             </a:r>
             <a:r>
-              <a:rPr lang="en-US" b="0" baseline="0" dirty="0" smtClean="0"/>
+              <a:rPr lang="en-US" b="0" baseline="0" dirty="0"/>
               <a:t>)</a:t>
             </a:r>
           </a:p>
@@ -1099,19 +1099,15 @@
               <a:buChar char="-"/>
             </a:pPr>
             <a:r>
-              <a:rPr lang="en-US" b="0" baseline="0" dirty="0" smtClean="0"/>
+              <a:rPr lang="en-US" b="0" baseline="0" dirty="0"/>
               <a:t>Selector (</a:t>
             </a:r>
             <a:r>
-              <a:rPr lang="en-US" b="1" baseline="0" dirty="0" smtClean="0"/>
-              <a:t>#</a:t>
+              <a:rPr lang="en-US" b="1" baseline="0" dirty="0"/>
+              <a:t>#my-input</a:t>
             </a:r>
             <a:r>
-              <a:rPr lang="en-US" b="1" baseline="0" dirty="0" err="1" smtClean="0"/>
-              <a:t>myInput</a:t>
-            </a:r>
-            <a:r>
-              <a:rPr lang="en-US" b="0" baseline="0" dirty="0" smtClean="0"/>
+              <a:rPr lang="en-US" b="0" baseline="0" dirty="0"/>
               <a:t>)</a:t>
             </a:r>
             <a:endParaRPr lang="en-US" dirty="0"/>
@@ -1199,43 +1195,39 @@
           <a:lstStyle/>
           <a:p>
             <a:r>
-              <a:rPr lang="en-US" dirty="0" smtClean="0"/>
+              <a:rPr lang="en-US" dirty="0"/>
               <a:t>For the </a:t>
             </a:r>
             <a:r>
-              <a:rPr lang="en-US" dirty="0" err="1" smtClean="0"/>
+              <a:rPr lang="en-US" dirty="0" err="1"/>
               <a:t>Repl</a:t>
             </a:r>
             <a:r>
-              <a:rPr lang="en-US" dirty="0" smtClean="0"/>
+              <a:rPr lang="en-US" dirty="0"/>
               <a:t>,</a:t>
             </a:r>
             <a:r>
-              <a:rPr lang="en-US" baseline="0" dirty="0" smtClean="0"/>
-              <a:t> </a:t>
-            </a:r>
-            <a:r>
-              <a:rPr lang="en-US" baseline="0" dirty="0" smtClean="0"/>
-              <a:t>show how DOM manipulation makes it possible to access the value of an HTML input in JavaScript.</a:t>
+              <a:rPr lang="en-US" baseline="0" dirty="0"/>
+              <a:t> show how DOM manipulation makes it possible to access the value of an HTML input in JavaScript.</a:t>
             </a:r>
           </a:p>
           <a:p>
-            <a:endParaRPr lang="en-US" baseline="0" dirty="0" smtClean="0"/>
+            <a:endParaRPr lang="en-US" baseline="0" dirty="0"/>
           </a:p>
           <a:p>
             <a:r>
-              <a:rPr lang="en-US" baseline="0" dirty="0" smtClean="0"/>
+              <a:rPr lang="en-US" baseline="0" dirty="0"/>
               <a:t>Emphasize the boiler-plate nature of the code; most of it will stay exactly the same to get the value from another input. The important thing is the </a:t>
             </a:r>
             <a:r>
-              <a:rPr lang="en-US" b="1" baseline="0" dirty="0" smtClean="0"/>
+              <a:rPr lang="en-US" b="1" baseline="0" dirty="0"/>
               <a:t>id</a:t>
             </a:r>
             <a:r>
-              <a:rPr lang="en-US" b="0" baseline="0" dirty="0" smtClean="0"/>
+              <a:rPr lang="en-US" b="0" baseline="0" dirty="0"/>
               <a:t> attribute value.</a:t>
             </a:r>
-            <a:endParaRPr lang="en-US" baseline="0" dirty="0" smtClean="0"/>
+            <a:endParaRPr lang="en-US" baseline="0" dirty="0"/>
           </a:p>
         </p:txBody>
       </p:sp>
@@ -1415,15 +1407,7 @@
           <a:p>
             <a:r>
               <a:rPr lang="en-US" dirty="0"/>
-              <a:t>Click to edit Master </a:t>
-            </a:r>
-            <a:r>
-              <a:rPr lang="en-US" dirty="0" smtClean="0"/>
-              <a:t>subtitle </a:t>
-            </a:r>
-            <a:r>
-              <a:rPr lang="en-US" dirty="0"/>
-              <a:t>style</a:t>
+              <a:t>Click to edit Master subtitle style</a:t>
             </a:r>
           </a:p>
         </p:txBody>
@@ -1465,7 +1449,7 @@
             <a:fld id="{1C2D31DE-C454-491C-B5C3-F097855E3DF7}" type="datetime4">
               <a:rPr lang="en-US" smtClean="0"/>
               <a:pPr/>
-              <a:t>March 26, 2020</a:t>
+              <a:t>September 6, 2022</a:t>
             </a:fld>
             <a:endParaRPr lang="en-US" dirty="0"/>
           </a:p>
@@ -4539,17 +4523,16 @@
           <a:p>
             <a:pPr lvl="0"/>
             <a:r>
-              <a:rPr lang="en-US" dirty="0" smtClean="0"/>
+              <a:rPr lang="en-US" dirty="0"/>
               <a:t>Presenter Name</a:t>
             </a:r>
             <a:br>
-              <a:rPr lang="en-US" dirty="0" smtClean="0"/>
+              <a:rPr lang="en-US" dirty="0"/>
             </a:br>
             <a:r>
-              <a:rPr lang="en-US" dirty="0" smtClean="0"/>
+              <a:rPr lang="en-US" dirty="0"/>
               <a:t>Presenter Title</a:t>
             </a:r>
-            <a:endParaRPr lang="en-US" dirty="0"/>
           </a:p>
         </p:txBody>
       </p:sp>
@@ -4566,13 +4549,6 @@
   <p:transition>
     <p:fade/>
   </p:transition>
-  <p:timing>
-    <p:tnLst>
-      <p:par>
-        <p:cTn id="1" dur="indefinite" restart="never" nodeType="tmRoot"/>
-      </p:par>
-    </p:tnLst>
-  </p:timing>
   <p:hf sldNum="0" hdr="0" ftr="0"/>
 </p:sldLayout>
 </file>
@@ -4865,7 +4841,7 @@
           <a:p>
             <a:fld id="{5958763E-B898-436D-883D-03711491D54A}" type="datetimeFigureOut">
               <a:rPr lang="en-US" smtClean="0"/>
-              <a:t>3/26/2020</a:t>
+              <a:t>9/6/2022</a:t>
             </a:fld>
             <a:endParaRPr lang="en-US"/>
           </a:p>
@@ -4938,13 +4914,6 @@
   <p:transition>
     <p:fade/>
   </p:transition>
-  <p:timing>
-    <p:tnLst>
-      <p:par>
-        <p:cTn id="1" dur="indefinite" restart="never" nodeType="tmRoot"/>
-      </p:par>
-    </p:tnLst>
-  </p:timing>
 </p:sldLayout>
 </file>
 
@@ -4993,10 +4962,9 @@
           </a:lstStyle>
           <a:p>
             <a:r>
-              <a:rPr lang="en-US" dirty="0" smtClean="0"/>
+              <a:rPr lang="en-US" dirty="0"/>
               <a:t>Click icon to add picture</a:t>
             </a:r>
-            <a:endParaRPr lang="en-US" dirty="0"/>
           </a:p>
         </p:txBody>
       </p:sp>
@@ -5066,7 +5034,7 @@
           <a:p>
             <a:fld id="{5958763E-B898-436D-883D-03711491D54A}" type="datetimeFigureOut">
               <a:rPr lang="en-US" smtClean="0"/>
-              <a:t>3/26/2020</a:t>
+              <a:t>9/6/2022</a:t>
             </a:fld>
             <a:endParaRPr lang="en-US"/>
           </a:p>
@@ -5139,13 +5107,6 @@
   <p:transition>
     <p:fade/>
   </p:transition>
-  <p:timing>
-    <p:tnLst>
-      <p:par>
-        <p:cTn id="1" dur="indefinite" restart="never" nodeType="tmRoot"/>
-      </p:par>
-    </p:tnLst>
-  </p:timing>
 </p:sldLayout>
 </file>
 
@@ -5323,7 +5284,7 @@
           <a:p>
             <a:fld id="{5958763E-B898-436D-883D-03711491D54A}" type="datetimeFigureOut">
               <a:rPr lang="en-US" smtClean="0"/>
-              <a:t>3/26/2020</a:t>
+              <a:t>9/6/2022</a:t>
             </a:fld>
             <a:endParaRPr lang="en-US"/>
           </a:p>
@@ -5396,13 +5357,6 @@
   <p:transition>
     <p:fade/>
   </p:transition>
-  <p:timing>
-    <p:tnLst>
-      <p:par>
-        <p:cTn id="1" dur="indefinite" restart="never" nodeType="tmRoot"/>
-      </p:par>
-    </p:tnLst>
-  </p:timing>
 </p:sldLayout>
 </file>
 
@@ -5678,7 +5632,7 @@
           <a:p>
             <a:fld id="{5958763E-B898-436D-883D-03711491D54A}" type="datetimeFigureOut">
               <a:rPr lang="en-US" smtClean="0"/>
-              <a:t>3/26/2020</a:t>
+              <a:t>9/6/2022</a:t>
             </a:fld>
             <a:endParaRPr lang="en-US"/>
           </a:p>
@@ -5739,13 +5693,6 @@
   <p:transition>
     <p:fade/>
   </p:transition>
-  <p:timing>
-    <p:tnLst>
-      <p:par>
-        <p:cTn id="1" dur="indefinite" restart="never" nodeType="tmRoot"/>
-      </p:par>
-    </p:tnLst>
-  </p:timing>
 </p:sldLayout>
 </file>
 
@@ -6101,7 +6048,7 @@
           <a:p>
             <a:fld id="{5958763E-B898-436D-883D-03711491D54A}" type="datetimeFigureOut">
               <a:rPr lang="en-US" smtClean="0"/>
-              <a:t>3/26/2020</a:t>
+              <a:t>9/6/2022</a:t>
             </a:fld>
             <a:endParaRPr lang="en-US"/>
           </a:p>
@@ -6162,13 +6109,6 @@
   <p:transition>
     <p:fade/>
   </p:transition>
-  <p:timing>
-    <p:tnLst>
-      <p:par>
-        <p:cTn id="1" dur="indefinite" restart="never" nodeType="tmRoot"/>
-      </p:par>
-    </p:tnLst>
-  </p:timing>
 </p:sldLayout>
 </file>
 
@@ -6609,7 +6549,7 @@
           <a:p>
             <a:fld id="{5958763E-B898-436D-883D-03711491D54A}" type="datetimeFigureOut">
               <a:rPr lang="en-US" smtClean="0"/>
-              <a:t>3/26/2020</a:t>
+              <a:t>9/6/2022</a:t>
             </a:fld>
             <a:endParaRPr lang="en-US"/>
           </a:p>
@@ -6670,13 +6610,6 @@
   <p:transition>
     <p:fade/>
   </p:transition>
-  <p:timing>
-    <p:tnLst>
-      <p:par>
-        <p:cTn id="1" dur="indefinite" restart="never" nodeType="tmRoot"/>
-      </p:par>
-    </p:tnLst>
-  </p:timing>
 </p:sldLayout>
 </file>
 
@@ -7067,7 +7000,7 @@
           <a:p>
             <a:fld id="{5958763E-B898-436D-883D-03711491D54A}" type="datetimeFigureOut">
               <a:rPr lang="en-US" smtClean="0"/>
-              <a:t>3/26/2020</a:t>
+              <a:t>9/6/2022</a:t>
             </a:fld>
             <a:endParaRPr lang="en-US"/>
           </a:p>
@@ -7128,13 +7061,6 @@
   <p:transition>
     <p:fade/>
   </p:transition>
-  <p:timing>
-    <p:tnLst>
-      <p:par>
-        <p:cTn id="1" dur="indefinite" restart="never" nodeType="tmRoot"/>
-      </p:par>
-    </p:tnLst>
-  </p:timing>
 </p:sldLayout>
 </file>
 
@@ -7685,7 +7611,7 @@
           <a:p>
             <a:fld id="{5958763E-B898-436D-883D-03711491D54A}" type="datetimeFigureOut">
               <a:rPr lang="en-US" smtClean="0"/>
-              <a:t>3/26/2020</a:t>
+              <a:t>9/6/2022</a:t>
             </a:fld>
             <a:endParaRPr lang="en-US"/>
           </a:p>
@@ -7746,13 +7672,6 @@
   <p:transition>
     <p:fade/>
   </p:transition>
-  <p:timing>
-    <p:tnLst>
-      <p:par>
-        <p:cTn id="1" dur="indefinite" restart="never" nodeType="tmRoot"/>
-      </p:par>
-    </p:tnLst>
-  </p:timing>
 </p:sldLayout>
 </file>
 
@@ -8463,7 +8382,7 @@
           <a:p>
             <a:fld id="{5958763E-B898-436D-883D-03711491D54A}" type="datetimeFigureOut">
               <a:rPr lang="en-US" smtClean="0"/>
-              <a:t>3/26/2020</a:t>
+              <a:t>9/6/2022</a:t>
             </a:fld>
             <a:endParaRPr lang="en-US"/>
           </a:p>
@@ -8524,13 +8443,6 @@
   <p:transition>
     <p:fade/>
   </p:transition>
-  <p:timing>
-    <p:tnLst>
-      <p:par>
-        <p:cTn id="1" dur="indefinite" restart="never" nodeType="tmRoot"/>
-      </p:par>
-    </p:tnLst>
-  </p:timing>
 </p:sldLayout>
 </file>
 
@@ -8574,7 +8486,7 @@
           <a:p>
             <a:fld id="{5958763E-B898-436D-883D-03711491D54A}" type="datetimeFigureOut">
               <a:rPr lang="en-US" smtClean="0"/>
-              <a:t>3/26/2020</a:t>
+              <a:t>9/6/2022</a:t>
             </a:fld>
             <a:endParaRPr lang="en-US"/>
           </a:p>
@@ -8647,13 +8559,6 @@
   <p:transition>
     <p:fade/>
   </p:transition>
-  <p:timing>
-    <p:tnLst>
-      <p:par>
-        <p:cTn id="1" dur="indefinite" restart="never" nodeType="tmRoot"/>
-      </p:par>
-    </p:tnLst>
-  </p:timing>
 </p:sldLayout>
 </file>
 
@@ -8733,7 +8638,7 @@
                 <a:spcPct val="0"/>
               </a:spcAft>
             </a:pPr>
-            <a:endParaRPr lang="en-US" sz="2400" dirty="0" err="1" smtClean="0">
+            <a:endParaRPr lang="en-US" sz="2400" dirty="0" err="1">
               <a:gradFill>
                 <a:gsLst>
                   <a:gs pos="0">
@@ -8866,15 +8771,7 @@
           <a:p>
             <a:r>
               <a:rPr lang="en-US" dirty="0"/>
-              <a:t>Click to edit Master </a:t>
-            </a:r>
-            <a:r>
-              <a:rPr lang="en-US" dirty="0" smtClean="0"/>
-              <a:t>subtitle </a:t>
-            </a:r>
-            <a:r>
-              <a:rPr lang="en-US" dirty="0"/>
-              <a:t>style</a:t>
+              <a:t>Click to edit Master subtitle style</a:t>
             </a:r>
           </a:p>
         </p:txBody>
@@ -8916,7 +8813,7 @@
             <a:fld id="{1C2D31DE-C454-491C-B5C3-F097855E3DF7}" type="datetime4">
               <a:rPr lang="en-US" smtClean="0"/>
               <a:pPr/>
-              <a:t>March 26, 2020</a:t>
+              <a:t>September 6, 2022</a:t>
             </a:fld>
             <a:endParaRPr lang="en-US" dirty="0"/>
           </a:p>
@@ -11990,17 +11887,16 @@
           <a:p>
             <a:pPr lvl="0"/>
             <a:r>
-              <a:rPr lang="en-US" dirty="0" smtClean="0"/>
+              <a:rPr lang="en-US" dirty="0"/>
               <a:t>Presenter Name</a:t>
             </a:r>
             <a:br>
-              <a:rPr lang="en-US" dirty="0" smtClean="0"/>
+              <a:rPr lang="en-US" dirty="0"/>
             </a:br>
             <a:r>
-              <a:rPr lang="en-US" dirty="0" smtClean="0"/>
+              <a:rPr lang="en-US" dirty="0"/>
               <a:t>Presenter Title</a:t>
             </a:r>
-            <a:endParaRPr lang="en-US" dirty="0"/>
           </a:p>
         </p:txBody>
       </p:sp>
@@ -12017,13 +11913,6 @@
   <p:transition>
     <p:fade/>
   </p:transition>
-  <p:timing>
-    <p:tnLst>
-      <p:par>
-        <p:cTn id="1" dur="indefinite" restart="never" nodeType="tmRoot"/>
-      </p:par>
-    </p:tnLst>
-  </p:timing>
   <p:hf sldNum="0" hdr="0" ftr="0"/>
 </p:sldLayout>
 </file>
@@ -12076,7 +11965,7 @@
           <a:p>
             <a:fld id="{5958763E-B898-436D-883D-03711491D54A}" type="datetimeFigureOut">
               <a:rPr lang="en-US" smtClean="0"/>
-              <a:t>3/26/2020</a:t>
+              <a:t>9/6/2022</a:t>
             </a:fld>
             <a:endParaRPr lang="en-US"/>
           </a:p>
@@ -12149,13 +12038,6 @@
   <p:transition>
     <p:fade/>
   </p:transition>
-  <p:timing>
-    <p:tnLst>
-      <p:par>
-        <p:cTn id="1" dur="indefinite" restart="never" nodeType="tmRoot"/>
-      </p:par>
-    </p:tnLst>
-  </p:timing>
 </p:sldLayout>
 </file>
 
@@ -12207,7 +12089,7 @@
           <a:p>
             <a:fld id="{5958763E-B898-436D-883D-03711491D54A}" type="datetimeFigureOut">
               <a:rPr lang="en-US" smtClean="0"/>
-              <a:t>3/26/2020</a:t>
+              <a:t>9/6/2022</a:t>
             </a:fld>
             <a:endParaRPr lang="en-US"/>
           </a:p>
@@ -12280,13 +12162,6 @@
   <p:transition>
     <p:fade/>
   </p:transition>
-  <p:timing>
-    <p:tnLst>
-      <p:par>
-        <p:cTn id="1" dur="indefinite" restart="never" nodeType="tmRoot"/>
-      </p:par>
-    </p:tnLst>
-  </p:timing>
 </p:sldLayout>
 </file>
 
@@ -12338,7 +12213,7 @@
           <a:p>
             <a:fld id="{5958763E-B898-436D-883D-03711491D54A}" type="datetimeFigureOut">
               <a:rPr lang="en-US" smtClean="0"/>
-              <a:t>3/26/2020</a:t>
+              <a:t>9/6/2022</a:t>
             </a:fld>
             <a:endParaRPr lang="en-US"/>
           </a:p>
@@ -12411,13 +12286,6 @@
   <p:transition>
     <p:fade/>
   </p:transition>
-  <p:timing>
-    <p:tnLst>
-      <p:par>
-        <p:cTn id="1" dur="indefinite" restart="never" nodeType="tmRoot"/>
-      </p:par>
-    </p:tnLst>
-  </p:timing>
 </p:sldLayout>
 </file>
 
@@ -12469,7 +12337,7 @@
           <a:p>
             <a:fld id="{5958763E-B898-436D-883D-03711491D54A}" type="datetimeFigureOut">
               <a:rPr lang="en-US" smtClean="0"/>
-              <a:t>3/26/2020</a:t>
+              <a:t>9/6/2022</a:t>
             </a:fld>
             <a:endParaRPr lang="en-US"/>
           </a:p>
@@ -12542,13 +12410,6 @@
   <p:transition>
     <p:fade/>
   </p:transition>
-  <p:timing>
-    <p:tnLst>
-      <p:par>
-        <p:cTn id="1" dur="indefinite" restart="never" nodeType="tmRoot"/>
-      </p:par>
-    </p:tnLst>
-  </p:timing>
 </p:sldLayout>
 </file>
 
@@ -12600,7 +12461,7 @@
           <a:p>
             <a:fld id="{5958763E-B898-436D-883D-03711491D54A}" type="datetimeFigureOut">
               <a:rPr lang="en-US" smtClean="0"/>
-              <a:t>3/26/2020</a:t>
+              <a:t>9/6/2022</a:t>
             </a:fld>
             <a:endParaRPr lang="en-US"/>
           </a:p>
@@ -12673,13 +12534,6 @@
   <p:transition>
     <p:fade/>
   </p:transition>
-  <p:timing>
-    <p:tnLst>
-      <p:par>
-        <p:cTn id="1" dur="indefinite" restart="never" nodeType="tmRoot"/>
-      </p:par>
-    </p:tnLst>
-  </p:timing>
 </p:sldLayout>
 </file>
 
@@ -12731,7 +12585,7 @@
           <a:p>
             <a:fld id="{5958763E-B898-436D-883D-03711491D54A}" type="datetimeFigureOut">
               <a:rPr lang="en-US" smtClean="0"/>
-              <a:t>3/26/2020</a:t>
+              <a:t>9/6/2022</a:t>
             </a:fld>
             <a:endParaRPr lang="en-US"/>
           </a:p>
@@ -12804,13 +12658,6 @@
   <p:transition>
     <p:fade/>
   </p:transition>
-  <p:timing>
-    <p:tnLst>
-      <p:par>
-        <p:cTn id="1" dur="indefinite" restart="never" nodeType="tmRoot"/>
-      </p:par>
-    </p:tnLst>
-  </p:timing>
 </p:sldLayout>
 </file>
 
@@ -12862,7 +12709,7 @@
           <a:p>
             <a:fld id="{5958763E-B898-436D-883D-03711491D54A}" type="datetimeFigureOut">
               <a:rPr lang="en-US" smtClean="0"/>
-              <a:t>3/26/2020</a:t>
+              <a:t>9/6/2022</a:t>
             </a:fld>
             <a:endParaRPr lang="en-US"/>
           </a:p>
@@ -12935,13 +12782,6 @@
   <p:transition>
     <p:fade/>
   </p:transition>
-  <p:timing>
-    <p:tnLst>
-      <p:par>
-        <p:cTn id="1" dur="indefinite" restart="never" nodeType="tmRoot"/>
-      </p:par>
-    </p:tnLst>
-  </p:timing>
 </p:sldLayout>
 </file>
 
@@ -12993,7 +12833,7 @@
           <a:p>
             <a:fld id="{5958763E-B898-436D-883D-03711491D54A}" type="datetimeFigureOut">
               <a:rPr lang="en-US" smtClean="0"/>
-              <a:t>3/26/2020</a:t>
+              <a:t>9/6/2022</a:t>
             </a:fld>
             <a:endParaRPr lang="en-US"/>
           </a:p>
@@ -13066,13 +12906,6 @@
   <p:transition>
     <p:fade/>
   </p:transition>
-  <p:timing>
-    <p:tnLst>
-      <p:par>
-        <p:cTn id="1" dur="indefinite" restart="never" nodeType="tmRoot"/>
-      </p:par>
-    </p:tnLst>
-  </p:timing>
 </p:sldLayout>
 </file>
 
@@ -13133,7 +12966,7 @@
           <a:p>
             <a:fld id="{5958763E-B898-436D-883D-03711491D54A}" type="datetimeFigureOut">
               <a:rPr lang="en-US" smtClean="0"/>
-              <a:t>3/26/2020</a:t>
+              <a:t>9/6/2022</a:t>
             </a:fld>
             <a:endParaRPr lang="en-US"/>
           </a:p>
@@ -13206,13 +13039,6 @@
   <p:transition>
     <p:fade/>
   </p:transition>
-  <p:timing>
-    <p:tnLst>
-      <p:par>
-        <p:cTn id="1" dur="indefinite" restart="never" nodeType="tmRoot"/>
-      </p:par>
-    </p:tnLst>
-  </p:timing>
 </p:sldLayout>
 </file>
 
@@ -16214,13 +16040,6 @@
   <p:transition>
     <p:fade/>
   </p:transition>
-  <p:timing>
-    <p:tnLst>
-      <p:par>
-        <p:cTn id="1" dur="indefinite" restart="never" nodeType="tmRoot"/>
-      </p:par>
-    </p:tnLst>
-  </p:timing>
 </p:sldLayout>
 </file>
 
@@ -16308,7 +16127,7 @@
                 <a:spcPct val="0"/>
               </a:spcAft>
             </a:pPr>
-            <a:endParaRPr lang="en-US" sz="2400" dirty="0" err="1" smtClean="0">
+            <a:endParaRPr lang="en-US" sz="2400" dirty="0" err="1">
               <a:gradFill>
                 <a:gsLst>
                   <a:gs pos="0">
@@ -16444,15 +16263,7 @@
           <a:p>
             <a:r>
               <a:rPr lang="en-US" dirty="0"/>
-              <a:t>Click to edit Master </a:t>
-            </a:r>
-            <a:r>
-              <a:rPr lang="en-US" dirty="0" smtClean="0"/>
-              <a:t>subtitle </a:t>
-            </a:r>
-            <a:r>
-              <a:rPr lang="en-US" dirty="0"/>
-              <a:t>style</a:t>
+              <a:t>Click to edit Master subtitle style</a:t>
             </a:r>
           </a:p>
         </p:txBody>
@@ -16494,7 +16305,7 @@
             <a:fld id="{1C2D31DE-C454-491C-B5C3-F097855E3DF7}" type="datetime4">
               <a:rPr lang="en-US" smtClean="0"/>
               <a:pPr/>
-              <a:t>March 26, 2020</a:t>
+              <a:t>September 6, 2022</a:t>
             </a:fld>
             <a:endParaRPr lang="en-US" dirty="0"/>
           </a:p>
@@ -19576,17 +19387,16 @@
           <a:p>
             <a:pPr lvl="0"/>
             <a:r>
-              <a:rPr lang="en-US" dirty="0" smtClean="0"/>
+              <a:rPr lang="en-US" dirty="0"/>
               <a:t>Presenter Name</a:t>
             </a:r>
             <a:br>
-              <a:rPr lang="en-US" dirty="0" smtClean="0"/>
+              <a:rPr lang="en-US" dirty="0"/>
             </a:br>
             <a:r>
-              <a:rPr lang="en-US" dirty="0" smtClean="0"/>
+              <a:rPr lang="en-US" dirty="0"/>
               <a:t>Presenter Title</a:t>
             </a:r>
-            <a:endParaRPr lang="en-US" dirty="0"/>
           </a:p>
         </p:txBody>
       </p:sp>
@@ -19603,13 +19413,6 @@
   <p:transition>
     <p:fade/>
   </p:transition>
-  <p:timing>
-    <p:tnLst>
-      <p:par>
-        <p:cTn id="1" dur="indefinite" restart="never" nodeType="tmRoot"/>
-      </p:par>
-    </p:tnLst>
-  </p:timing>
   <p:hf sldNum="0" hdr="0" ftr="0"/>
 </p:sldLayout>
 </file>
@@ -27119,10 +26922,9 @@
           <a:p>
             <a:pPr lvl="0"/>
             <a:r>
-              <a:rPr lang="en-US" dirty="0" smtClean="0"/>
+              <a:rPr lang="en-US" dirty="0"/>
               <a:t>&lt;Call to action&gt;</a:t>
             </a:r>
-            <a:endParaRPr lang="en-US" dirty="0"/>
           </a:p>
         </p:txBody>
       </p:sp>
@@ -28739,7 +28541,7 @@
           <a:p>
             <a:fld id="{5958763E-B898-436D-883D-03711491D54A}" type="datetimeFigureOut">
               <a:rPr lang="en-US" smtClean="0"/>
-              <a:t>3/26/2020</a:t>
+              <a:t>9/6/2022</a:t>
             </a:fld>
             <a:endParaRPr lang="en-US"/>
           </a:p>
@@ -28866,7 +28668,7 @@
                 <a:spcPct val="0"/>
               </a:spcAft>
             </a:pPr>
-            <a:endParaRPr lang="en-US" sz="2400" dirty="0" err="1" smtClean="0">
+            <a:endParaRPr lang="en-US" sz="2400" dirty="0" err="1">
               <a:gradFill>
                 <a:gsLst>
                   <a:gs pos="0">
@@ -28897,13 +28699,6 @@
   <p:transition>
     <p:fade/>
   </p:transition>
-  <p:timing>
-    <p:tnLst>
-      <p:par>
-        <p:cTn id="1" dur="indefinite" restart="never" nodeType="tmRoot"/>
-      </p:par>
-    </p:tnLst>
-  </p:timing>
 </p:sldLayout>
 </file>
 
@@ -29148,7 +28943,7 @@
           <a:p>
             <a:fld id="{5958763E-B898-436D-883D-03711491D54A}" type="datetimeFigureOut">
               <a:rPr lang="en-US" smtClean="0"/>
-              <a:t>3/26/2020</a:t>
+              <a:t>9/6/2022</a:t>
             </a:fld>
             <a:endParaRPr lang="en-US"/>
           </a:p>
@@ -29221,13 +29016,6 @@
   <p:transition>
     <p:fade/>
   </p:transition>
-  <p:timing>
-    <p:tnLst>
-      <p:par>
-        <p:cTn id="1" dur="indefinite" restart="never" nodeType="tmRoot"/>
-      </p:par>
-    </p:tnLst>
-  </p:timing>
 </p:sldLayout>
 </file>
 
@@ -29449,7 +29237,7 @@
           <a:p>
             <a:fld id="{5958763E-B898-436D-883D-03711491D54A}" type="datetimeFigureOut">
               <a:rPr lang="en-US" smtClean="0"/>
-              <a:t>3/26/2020</a:t>
+              <a:t>9/6/2022</a:t>
             </a:fld>
             <a:endParaRPr lang="en-US"/>
           </a:p>
@@ -29522,13 +29310,6 @@
   <p:transition>
     <p:fade/>
   </p:transition>
-  <p:timing>
-    <p:tnLst>
-      <p:par>
-        <p:cTn id="1" dur="indefinite" restart="never" nodeType="tmRoot"/>
-      </p:par>
-    </p:tnLst>
-  </p:timing>
 </p:sldLayout>
 </file>
 
@@ -29657,7 +29438,7 @@
           <a:p>
             <a:fld id="{5958763E-B898-436D-883D-03711491D54A}" type="datetimeFigureOut">
               <a:rPr lang="en-US" smtClean="0"/>
-              <a:t>3/26/2020</a:t>
+              <a:t>9/6/2022</a:t>
             </a:fld>
             <a:endParaRPr lang="en-US"/>
           </a:p>
@@ -29780,13 +29561,6 @@
   <p:transition>
     <p:fade/>
   </p:transition>
-  <p:timing>
-    <p:tnLst>
-      <p:par>
-        <p:cTn id="1" dur="indefinite" restart="never" nodeType="tmRoot"/>
-      </p:par>
-    </p:tnLst>
-  </p:timing>
 </p:sldLayout>
 </file>
 
@@ -29925,7 +29699,7 @@
           <a:p>
             <a:fld id="{5958763E-B898-436D-883D-03711491D54A}" type="datetimeFigureOut">
               <a:rPr lang="en-US" smtClean="0"/>
-              <a:t>3/26/2020</a:t>
+              <a:t>9/6/2022</a:t>
             </a:fld>
             <a:endParaRPr lang="en-US"/>
           </a:p>
@@ -30052,13 +29826,6 @@
   <p:transition>
     <p:fade/>
   </p:transition>
-  <p:timing>
-    <p:tnLst>
-      <p:par>
-        <p:cTn id="1" dur="indefinite" restart="never" nodeType="tmRoot"/>
-      </p:par>
-    </p:tnLst>
-  </p:timing>
 </p:sldLayout>
 </file>
 
@@ -30220,7 +29987,7 @@
                 <a:spcPct val="0"/>
               </a:spcAft>
             </a:pPr>
-            <a:endParaRPr lang="en-US" sz="2400" dirty="0" err="1" smtClean="0">
+            <a:endParaRPr lang="en-US" sz="2400" dirty="0" err="1">
               <a:gradFill>
                 <a:gsLst>
                   <a:gs pos="0">
@@ -30271,10 +30038,9 @@
           </a:lstStyle>
           <a:p>
             <a:r>
-              <a:rPr lang="en-US" dirty="0" smtClean="0"/>
+              <a:rPr lang="en-US" dirty="0"/>
               <a:t>Type “Agenda”</a:t>
             </a:r>
-            <a:endParaRPr lang="en-US" dirty="0"/>
           </a:p>
         </p:txBody>
       </p:sp>
@@ -30398,24 +30164,23 @@
           <a:p>
             <a:pPr lvl="0"/>
             <a:r>
-              <a:rPr lang="en-US" dirty="0" smtClean="0"/>
+              <a:rPr lang="en-US" dirty="0"/>
               <a:t>Item 1</a:t>
             </a:r>
           </a:p>
           <a:p>
             <a:pPr lvl="0"/>
             <a:r>
-              <a:rPr lang="en-US" dirty="0" smtClean="0"/>
+              <a:rPr lang="en-US" dirty="0"/>
               <a:t>Item 2</a:t>
             </a:r>
           </a:p>
           <a:p>
             <a:pPr lvl="0"/>
             <a:r>
-              <a:rPr lang="en-US" dirty="0" smtClean="0"/>
+              <a:rPr lang="en-US" dirty="0"/>
               <a:t>Item 3</a:t>
             </a:r>
-            <a:endParaRPr lang="en-US" dirty="0"/>
           </a:p>
         </p:txBody>
       </p:sp>
@@ -30442,7 +30207,7 @@
           <a:p>
             <a:fld id="{5958763E-B898-436D-883D-03711491D54A}" type="datetimeFigureOut">
               <a:rPr lang="en-US" smtClean="0"/>
-              <a:t>3/26/2020</a:t>
+              <a:t>9/6/2022</a:t>
             </a:fld>
             <a:endParaRPr lang="en-US"/>
           </a:p>
@@ -30549,13 +30314,6 @@
   <p:transition>
     <p:fade/>
   </p:transition>
-  <p:timing>
-    <p:tnLst>
-      <p:par>
-        <p:cTn id="1" dur="indefinite" restart="never" nodeType="tmRoot"/>
-      </p:par>
-    </p:tnLst>
-  </p:timing>
 </p:sldLayout>
 </file>
 
@@ -30717,7 +30475,7 @@
                 <a:spcPct val="0"/>
               </a:spcAft>
             </a:pPr>
-            <a:endParaRPr lang="en-US" sz="2400" dirty="0" err="1" smtClean="0">
+            <a:endParaRPr lang="en-US" sz="2400" dirty="0" err="1">
               <a:gradFill>
                 <a:gsLst>
                   <a:gs pos="0">
@@ -30770,10 +30528,9 @@
           </a:lstStyle>
           <a:p>
             <a:r>
-              <a:rPr lang="en-US" dirty="0" smtClean="0"/>
+              <a:rPr lang="en-US" dirty="0"/>
               <a:t>Notable Quote</a:t>
             </a:r>
-            <a:endParaRPr lang="en-US" dirty="0"/>
           </a:p>
         </p:txBody>
       </p:sp>
@@ -30900,10 +30657,9 @@
           <a:p>
             <a:pPr lvl="0"/>
             <a:r>
-              <a:rPr lang="en-US" dirty="0" smtClean="0"/>
+              <a:rPr lang="en-US" dirty="0"/>
               <a:t>– Attribution</a:t>
             </a:r>
-            <a:endParaRPr lang="en-US" dirty="0"/>
           </a:p>
         </p:txBody>
       </p:sp>
@@ -30930,7 +30686,7 @@
           <a:p>
             <a:fld id="{5958763E-B898-436D-883D-03711491D54A}" type="datetimeFigureOut">
               <a:rPr lang="en-US" smtClean="0"/>
-              <a:t>3/26/2020</a:t>
+              <a:t>9/6/2022</a:t>
             </a:fld>
             <a:endParaRPr lang="en-US"/>
           </a:p>
@@ -31678,13 +31434,6 @@
   <p:transition>
     <p:fade/>
   </p:transition>
-  <p:timing>
-    <p:tnLst>
-      <p:par>
-        <p:cTn id="1" dur="indefinite" restart="never" nodeType="tmRoot"/>
-      </p:par>
-    </p:tnLst>
-  </p:timing>
 </p:sldLayout>
 </file>
 
@@ -31756,7 +31505,7 @@
           <a:p>
             <a:fld id="{5958763E-B898-436D-883D-03711491D54A}" type="datetimeFigureOut">
               <a:rPr lang="en-US" smtClean="0"/>
-              <a:t>3/26/2020</a:t>
+              <a:t>9/6/2022</a:t>
             </a:fld>
             <a:endParaRPr lang="en-US"/>
           </a:p>
@@ -31829,13 +31578,6 @@
   <p:transition>
     <p:fade/>
   </p:transition>
-  <p:timing>
-    <p:tnLst>
-      <p:par>
-        <p:cTn id="1" dur="indefinite" restart="never" nodeType="tmRoot"/>
-      </p:par>
-    </p:tnLst>
-  </p:timing>
 </p:sldLayout>
 </file>
 
@@ -31964,7 +31706,7 @@
           <a:p>
             <a:fld id="{5958763E-B898-436D-883D-03711491D54A}" type="datetimeFigureOut">
               <a:rPr lang="en-US" smtClean="0"/>
-              <a:t>3/26/2020</a:t>
+              <a:t>9/6/2022</a:t>
             </a:fld>
             <a:endParaRPr lang="en-US"/>
           </a:p>
@@ -32087,13 +31829,6 @@
   <p:transition>
     <p:fade/>
   </p:transition>
-  <p:timing>
-    <p:tnLst>
-      <p:par>
-        <p:cTn id="1" dur="indefinite" restart="never" nodeType="tmRoot"/>
-      </p:par>
-    </p:tnLst>
-  </p:timing>
 </p:sldLayout>
 </file>
 
@@ -32306,7 +32041,7 @@
           <a:p>
             <a:fld id="{5958763E-B898-436D-883D-03711491D54A}" type="datetimeFigureOut">
               <a:rPr lang="en-US" smtClean="0"/>
-              <a:t>3/26/2020</a:t>
+              <a:t>9/6/2022</a:t>
             </a:fld>
             <a:endParaRPr lang="en-US"/>
           </a:p>
@@ -32379,13 +32114,6 @@
   <p:transition>
     <p:fade/>
   </p:transition>
-  <p:timing>
-    <p:tnLst>
-      <p:par>
-        <p:cTn id="1" dur="indefinite" restart="never" nodeType="tmRoot"/>
-      </p:par>
-    </p:tnLst>
-  </p:timing>
 </p:sldLayout>
 </file>
 
@@ -32543,7 +32271,7 @@
           <a:p>
             <a:fld id="{5958763E-B898-436D-883D-03711491D54A}" type="datetimeFigureOut">
               <a:rPr lang="en-US" smtClean="0"/>
-              <a:t>3/26/2020</a:t>
+              <a:t>9/6/2022</a:t>
             </a:fld>
             <a:endParaRPr lang="en-US"/>
           </a:p>
@@ -32616,13 +32344,6 @@
   <p:transition>
     <p:fade/>
   </p:transition>
-  <p:timing>
-    <p:tnLst>
-      <p:par>
-        <p:cTn id="1" dur="indefinite" restart="never" nodeType="tmRoot"/>
-      </p:par>
-    </p:tnLst>
-  </p:timing>
 </p:sldLayout>
 </file>
 
@@ -32794,7 +32515,7 @@
           <a:p>
             <a:fld id="{5958763E-B898-436D-883D-03711491D54A}" type="datetimeFigureOut">
               <a:rPr lang="en-US" smtClean="0"/>
-              <a:t>3/26/2020</a:t>
+              <a:t>9/6/2022</a:t>
             </a:fld>
             <a:endParaRPr lang="en-US"/>
           </a:p>
@@ -32940,13 +32661,6 @@
   <p:transition>
     <p:fade/>
   </p:transition>
-  <p:timing>
-    <p:tnLst>
-      <p:par>
-        <p:cTn id="1" dur="indefinite" restart="never" nodeType="tmRoot"/>
-      </p:par>
-    </p:tnLst>
-  </p:timing>
   <p:txStyles>
     <p:titleStyle>
       <a:lvl1pPr algn="l" defTabSz="914400" rtl="0" eaLnBrk="1" latinLnBrk="0" hangingPunct="1">
@@ -33251,7 +32965,7 @@
       </a:lvl9pPr>
     </p:otherStyle>
   </p:txStyles>
-  <p:extLst mod="1">
+  <p:extLst>
     <p:ext uri="{27BBF7A9-308A-43DC-89C8-2F10F3537804}">
       <p15:sldGuideLst xmlns:p15="http://schemas.microsoft.com/office/powerpoint/2012/main">
         <p15:guide id="1" orient="horz" pos="2160" userDrawn="1">
@@ -33330,10 +33044,9 @@
           <a:lstStyle/>
           <a:p>
             <a:r>
-              <a:rPr lang="en-US" sz="6600" dirty="0" smtClean="0"/>
+              <a:rPr lang="en-US" sz="6600" dirty="0"/>
               <a:t>Introduction to DOM Manipulation</a:t>
             </a:r>
-            <a:endParaRPr lang="en-US" sz="6600" dirty="0"/>
           </a:p>
         </p:txBody>
       </p:sp>
@@ -33358,11 +33071,11 @@
           <a:lstStyle/>
           <a:p>
             <a:r>
-              <a:rPr lang="en-US" dirty="0" smtClean="0"/>
+              <a:rPr lang="en-US" dirty="0"/>
               <a:t>Hy-Tech Club: </a:t>
             </a:r>
             <a:r>
-              <a:rPr lang="en-US" smtClean="0"/>
+              <a:rPr lang="en-US"/>
               <a:t>Web 102</a:t>
             </a:r>
             <a:endParaRPr lang="en-US" dirty="0"/>
@@ -36350,13 +36063,6 @@
   <p:transition>
     <p:fade/>
   </p:transition>
-  <p:timing>
-    <p:tnLst>
-      <p:par>
-        <p:cTn id="1" dur="indefinite" restart="never" nodeType="tmRoot"/>
-      </p:par>
-    </p:tnLst>
-  </p:timing>
 </p:sld>
 </file>
 
@@ -36403,14 +36109,9 @@
           <a:lstStyle/>
           <a:p>
             <a:r>
-              <a:rPr lang="en-US" dirty="0" smtClean="0"/>
-              <a:t>Reading from input </a:t>
+              <a:rPr lang="en-US" dirty="0"/>
+              <a:t>Reading from input example</a:t>
             </a:r>
-            <a:r>
-              <a:rPr lang="en-US" dirty="0" smtClean="0"/>
-              <a:t>example</a:t>
-            </a:r>
-            <a:endParaRPr lang="en-US" dirty="0"/>
           </a:p>
         </p:txBody>
       </p:sp>
@@ -36438,7 +36139,7 @@
               <a:rPr lang="en-US" sz="11500" dirty="0">
                 <a:hlinkClick r:id="rId3"/>
               </a:rPr>
-              <a:t>https://repl.it/repls/PapayawhipRubberyModels</a:t>
+              <a:t>https://replit.com/@HylandOutreach/ReadFromDom</a:t>
             </a:r>
             <a:endParaRPr lang="en-US" sz="13800" dirty="0"/>
           </a:p>
@@ -36457,13 +36158,67 @@
   <p:transition>
     <p:fade/>
   </p:transition>
-  <p:timing>
-    <p:tnLst>
-      <p:par>
-        <p:cTn id="1" dur="indefinite" restart="never" nodeType="tmRoot"/>
-      </p:par>
-    </p:tnLst>
-  </p:timing>
+</p:sld>
+</file>
+
+<file path=ppt/slides/slide11.xml><?xml version="1.0" encoding="utf-8"?>
+<p:sld xmlns:a="http://schemas.openxmlformats.org/drawingml/2006/main" xmlns:r="http://schemas.openxmlformats.org/officeDocument/2006/relationships" xmlns:p="http://schemas.openxmlformats.org/presentationml/2006/main">
+  <p:cSld>
+    <p:spTree>
+      <p:nvGrpSpPr>
+        <p:cNvPr id="1" name=""/>
+        <p:cNvGrpSpPr/>
+        <p:nvPr/>
+      </p:nvGrpSpPr>
+      <p:grpSpPr>
+        <a:xfrm>
+          <a:off x="0" y="0"/>
+          <a:ext cx="0" cy="0"/>
+          <a:chOff x="0" y="0"/>
+          <a:chExt cx="0" cy="0"/>
+        </a:xfrm>
+      </p:grpSpPr>
+      <p:sp>
+        <p:nvSpPr>
+          <p:cNvPr id="2" name="Text Placeholder 1">
+            <a:extLst>
+              <a:ext uri="{FF2B5EF4-FFF2-40B4-BE49-F238E27FC236}">
+                <a16:creationId xmlns:a16="http://schemas.microsoft.com/office/drawing/2014/main" id="{0BD9567A-D911-4354-AEEA-DDA2EF757934}"/>
+              </a:ext>
+            </a:extLst>
+          </p:cNvPr>
+          <p:cNvSpPr>
+            <a:spLocks noGrp="1"/>
+          </p:cNvSpPr>
+          <p:nvPr>
+            <p:ph type="body" sz="quarter" idx="10"/>
+          </p:nvPr>
+        </p:nvSpPr>
+        <p:spPr/>
+        <p:txBody>
+          <a:bodyPr/>
+          <a:lstStyle/>
+          <a:p>
+            <a:r>
+              <a:rPr lang="en-US" dirty="0"/>
+              <a:t>Questions?</a:t>
+            </a:r>
+          </a:p>
+        </p:txBody>
+      </p:sp>
+    </p:spTree>
+    <p:extLst>
+      <p:ext uri="{BB962C8B-B14F-4D97-AF65-F5344CB8AC3E}">
+        <p14:creationId xmlns:p14="http://schemas.microsoft.com/office/powerpoint/2010/main" val="3776173211"/>
+      </p:ext>
+    </p:extLst>
+  </p:cSld>
+  <p:clrMapOvr>
+    <a:masterClrMapping/>
+  </p:clrMapOvr>
+  <p:transition>
+    <p:fade/>
+  </p:transition>
 </p:sld>
 </file>
 
@@ -36500,19 +36255,19 @@
           <a:lstStyle/>
           <a:p>
             <a:r>
-              <a:rPr lang="en-US" dirty="0" smtClean="0"/>
+              <a:rPr lang="en-US" dirty="0"/>
               <a:t>Review: </a:t>
             </a:r>
             <a:r>
-              <a:rPr lang="en-US" dirty="0" err="1" smtClean="0"/>
+              <a:rPr lang="en-US" dirty="0" err="1"/>
               <a:t>Javascript</a:t>
             </a:r>
             <a:r>
-              <a:rPr lang="en-US" dirty="0" smtClean="0"/>
+              <a:rPr lang="en-US" dirty="0"/>
               <a:t> </a:t>
             </a:r>
             <a:r>
-              <a:rPr lang="en-US" sz="4000" cap="none" dirty="0" smtClean="0">
+              <a:rPr lang="en-US" sz="4000" cap="none" dirty="0">
                 <a:solidFill>
                   <a:schemeClr val="accent1">
                     <a:lumMod val="50000"/>
@@ -36523,10 +36278,9 @@
               <a:t>prompt</a:t>
             </a:r>
             <a:r>
-              <a:rPr lang="en-US" dirty="0" smtClean="0"/>
+              <a:rPr lang="en-US" dirty="0"/>
               <a:t>s</a:t>
             </a:r>
-            <a:endParaRPr lang="en-US" dirty="0"/>
           </a:p>
         </p:txBody>
       </p:sp>
@@ -36549,13 +36303,13 @@
               <a:buNone/>
             </a:pPr>
             <a:r>
-              <a:rPr lang="en-US" sz="4400" dirty="0" err="1">
+              <a:rPr lang="en-US" sz="4400" dirty="0">
                 <a:solidFill>
                   <a:srgbClr val="0000FF"/>
                 </a:solidFill>
                 <a:latin typeface="Consolas" panose="020B0609020204030204" pitchFamily="49" charset="0"/>
               </a:rPr>
-              <a:t>var</a:t>
+              <a:t>let</a:t>
             </a:r>
             <a:r>
               <a:rPr lang="en-US" sz="4400" dirty="0">
@@ -36564,19 +36318,10 @@
                 </a:solidFill>
                 <a:latin typeface="Consolas" panose="020B0609020204030204" pitchFamily="49" charset="0"/>
               </a:rPr>
-              <a:t> name = prompt</a:t>
+              <a:t> name = prompt(</a:t>
             </a:r>
             <a:r>
-              <a:rPr lang="en-US" sz="4400" dirty="0" smtClean="0">
-                <a:solidFill>
-                  <a:srgbClr val="000000"/>
-                </a:solidFill>
-                <a:latin typeface="Consolas" panose="020B0609020204030204" pitchFamily="49" charset="0"/>
-              </a:rPr>
-              <a:t>(</a:t>
-            </a:r>
-            <a:r>
-              <a:rPr lang="en-US" sz="4400" dirty="0" smtClean="0">
+              <a:rPr lang="en-US" sz="4400" dirty="0">
                 <a:solidFill>
                   <a:srgbClr val="A31515"/>
                 </a:solidFill>
@@ -36585,7 +36330,7 @@
               <a:t>"Name:"</a:t>
             </a:r>
             <a:r>
-              <a:rPr lang="en-US" sz="4400" dirty="0" smtClean="0">
+              <a:rPr lang="en-US" sz="4400" dirty="0">
                 <a:solidFill>
                   <a:srgbClr val="000000"/>
                 </a:solidFill>
@@ -36595,14 +36340,14 @@
             </a:r>
           </a:p>
           <a:p>
-            <a:endParaRPr lang="en-US" sz="3600" dirty="0" smtClean="0"/>
+            <a:endParaRPr lang="en-US" sz="3600" dirty="0"/>
           </a:p>
           <a:p>
             <a:pPr marL="57150" indent="0">
               <a:buNone/>
             </a:pPr>
             <a:r>
-              <a:rPr lang="en-US" sz="3600" dirty="0" smtClean="0"/>
+              <a:rPr lang="en-US" sz="3600" dirty="0"/>
               <a:t>Prompts make user input easy to receive, but what is wrong with them?</a:t>
             </a:r>
           </a:p>
@@ -36614,10 +36359,9 @@
               <a:buNone/>
             </a:pPr>
             <a:r>
-              <a:rPr lang="en-US" sz="3600" i="1" dirty="0" smtClean="0"/>
+              <a:rPr lang="en-US" sz="3600" i="1" dirty="0"/>
               <a:t>The user experience is not good!</a:t>
             </a:r>
-            <a:endParaRPr lang="en-US" sz="3600" i="1" dirty="0"/>
           </a:p>
           <a:p>
             <a:pPr marL="57150" indent="0">
@@ -36892,10 +36636,9 @@
           <a:lstStyle/>
           <a:p>
             <a:r>
-              <a:rPr lang="en-US" dirty="0" smtClean="0"/>
+              <a:rPr lang="en-US" dirty="0"/>
               <a:t>Review: HTML Forms</a:t>
             </a:r>
-            <a:endParaRPr lang="en-US" dirty="0"/>
           </a:p>
         </p:txBody>
       </p:sp>
@@ -37054,7 +36797,7 @@
                 </a:solidFill>
                 <a:latin typeface="Consolas" panose="020B0609020204030204" pitchFamily="49" charset="0"/>
               </a:rPr>
-              <a:t>&gt;&lt;/p&gt;</a:t>
+              <a:t> /&gt;&lt;/p&gt;</a:t>
             </a:r>
             <a:endParaRPr lang="en-US" sz="3200" dirty="0">
               <a:solidFill>
@@ -37119,7 +36862,7 @@
                 </a:solidFill>
                 <a:latin typeface="Consolas" panose="020B0609020204030204" pitchFamily="49" charset="0"/>
               </a:rPr>
-              <a:t>&gt;</a:t>
+              <a:t> /&gt;</a:t>
             </a:r>
             <a:endParaRPr lang="en-US" sz="3200" dirty="0">
               <a:solidFill>
@@ -37139,31 +36882,22 @@
                 </a:solidFill>
                 <a:latin typeface="Consolas" panose="020B0609020204030204" pitchFamily="49" charset="0"/>
               </a:rPr>
-              <a:t>&lt;/form</a:t>
+              <a:t>&lt;/form&gt;</a:t>
             </a:r>
-            <a:r>
-              <a:rPr lang="en-US" sz="3200" dirty="0" smtClean="0">
-                <a:solidFill>
-                  <a:srgbClr val="800000"/>
-                </a:solidFill>
-                <a:latin typeface="Consolas" panose="020B0609020204030204" pitchFamily="49" charset="0"/>
-              </a:rPr>
-              <a:t>&gt;</a:t>
-            </a:r>
-            <a:endParaRPr lang="en-US" sz="2400" dirty="0" smtClean="0"/>
+            <a:endParaRPr lang="en-US" sz="2400" dirty="0"/>
           </a:p>
           <a:p>
             <a:pPr marL="57150" indent="0">
               <a:buNone/>
             </a:pPr>
-            <a:endParaRPr lang="en-US" sz="3600" dirty="0" smtClean="0"/>
+            <a:endParaRPr lang="en-US" sz="3600" dirty="0"/>
           </a:p>
           <a:p>
             <a:pPr marL="57150" indent="0">
               <a:buNone/>
             </a:pPr>
             <a:r>
-              <a:rPr lang="en-US" dirty="0" smtClean="0"/>
+              <a:rPr lang="en-US" dirty="0"/>
               <a:t>Forms are easy for the user, but where does the data go?</a:t>
             </a:r>
           </a:p>
@@ -37178,7 +36912,7 @@
               <a:buNone/>
             </a:pPr>
             <a:r>
-              <a:rPr lang="en-US" i="1" dirty="0" smtClean="0"/>
+              <a:rPr lang="en-US" i="1" dirty="0"/>
               <a:t>A back-end is required to deal with form submissions.</a:t>
             </a:r>
           </a:p>
@@ -37192,7 +36926,7 @@
             <a:pPr marL="57150" indent="0">
               <a:buNone/>
             </a:pPr>
-            <a:endParaRPr lang="en-US" i="1" dirty="0" smtClean="0"/>
+            <a:endParaRPr lang="en-US" i="1" dirty="0"/>
           </a:p>
         </p:txBody>
       </p:sp>
@@ -37596,19 +37330,11 @@
           <a:p>
             <a:r>
               <a:rPr lang="en-US" b="0" cap="none" dirty="0"/>
-              <a:t>W</a:t>
-            </a:r>
-            <a:r>
-              <a:rPr lang="en-US" b="0" cap="none" dirty="0" smtClean="0"/>
-              <a:t>hat if it were possible to use the values the user enters into HTML inputs directly in JavaScript?</a:t>
+              <a:t>What if it were possible to use the values the user enters into HTML inputs directly in JavaScript?</a:t>
             </a:r>
             <a:br>
-              <a:rPr lang="en-US" b="0" cap="none" dirty="0" smtClean="0"/>
+              <a:rPr lang="en-US" b="0" cap="none" dirty="0"/>
             </a:br>
-            <a:r>
-              <a:rPr lang="en-US" b="0" cap="none" dirty="0"/>
-              <a:t/>
-            </a:r>
             <a:br>
               <a:rPr lang="en-US" b="0" cap="none" dirty="0"/>
             </a:br>
@@ -37647,18 +37373,13 @@
               </a:spcAft>
             </a:pPr>
             <a:r>
-              <a:rPr lang="en-US" sz="6600" b="1" dirty="0" smtClean="0">
+              <a:rPr lang="en-US" sz="6600" b="1" dirty="0">
                 <a:solidFill>
                   <a:schemeClr val="bg1"/>
                 </a:solidFill>
               </a:rPr>
               <a:t>It is!</a:t>
             </a:r>
-            <a:endParaRPr lang="en-US" sz="6600" b="1" dirty="0" smtClean="0">
-              <a:solidFill>
-                <a:schemeClr val="bg1"/>
-              </a:solidFill>
-            </a:endParaRPr>
           </a:p>
         </p:txBody>
       </p:sp>
@@ -37797,10 +37518,9 @@
           <a:lstStyle/>
           <a:p>
             <a:r>
-              <a:rPr lang="en-US" dirty="0" smtClean="0"/>
+              <a:rPr lang="en-US" dirty="0"/>
               <a:t>What is the DOM?</a:t>
             </a:r>
-            <a:endParaRPr lang="en-US" dirty="0"/>
           </a:p>
         </p:txBody>
       </p:sp>
@@ -37825,70 +37545,70 @@
               <a:buNone/>
             </a:pPr>
             <a:r>
-              <a:rPr lang="en-US" sz="4400" b="1" dirty="0" smtClean="0"/>
+              <a:rPr lang="en-US" sz="4400" b="1" dirty="0"/>
               <a:t>D</a:t>
             </a:r>
             <a:r>
-              <a:rPr lang="en-US" sz="4400" dirty="0" smtClean="0"/>
+              <a:rPr lang="en-US" sz="4400" dirty="0"/>
               <a:t>ocument </a:t>
             </a:r>
             <a:r>
-              <a:rPr lang="en-US" sz="4400" b="1" dirty="0" smtClean="0"/>
+              <a:rPr lang="en-US" sz="4400" b="1" dirty="0"/>
               <a:t>O</a:t>
             </a:r>
             <a:r>
-              <a:rPr lang="en-US" sz="4400" dirty="0" smtClean="0"/>
+              <a:rPr lang="en-US" sz="4400" dirty="0"/>
               <a:t>bject </a:t>
             </a:r>
             <a:r>
-              <a:rPr lang="en-US" sz="4400" b="1" dirty="0" smtClean="0"/>
+              <a:rPr lang="en-US" sz="4400" b="1" dirty="0"/>
               <a:t>M</a:t>
             </a:r>
             <a:r>
-              <a:rPr lang="en-US" sz="4400" dirty="0" smtClean="0"/>
+              <a:rPr lang="en-US" sz="4400" dirty="0"/>
               <a:t>odel</a:t>
             </a:r>
           </a:p>
           <a:p>
-            <a:endParaRPr lang="en-US" sz="3200" dirty="0" smtClean="0"/>
+            <a:endParaRPr lang="en-US" sz="3200" dirty="0"/>
           </a:p>
           <a:p>
             <a:r>
-              <a:rPr lang="en-US" sz="3200" dirty="0" smtClean="0"/>
+              <a:rPr lang="en-US" sz="3200" dirty="0"/>
               <a:t>It is a </a:t>
             </a:r>
             <a:r>
-              <a:rPr lang="en-US" sz="3200" i="1" dirty="0" smtClean="0"/>
+              <a:rPr lang="en-US" sz="3200" i="1" dirty="0"/>
               <a:t>programming interface</a:t>
             </a:r>
             <a:r>
-              <a:rPr lang="en-US" sz="3200" dirty="0" smtClean="0"/>
+              <a:rPr lang="en-US" sz="3200" dirty="0"/>
               <a:t> for HTML documents</a:t>
             </a:r>
           </a:p>
           <a:p>
-            <a:endParaRPr lang="en-US" sz="3200" dirty="0" smtClean="0"/>
+            <a:endParaRPr lang="en-US" sz="3200" dirty="0"/>
           </a:p>
           <a:p>
             <a:r>
-              <a:rPr lang="en-US" sz="3200" dirty="0" smtClean="0"/>
+              <a:rPr lang="en-US" sz="3200" dirty="0"/>
               <a:t>Allows programs to change document structure, style, and content on an HTML page</a:t>
             </a:r>
           </a:p>
           <a:p>
-            <a:endParaRPr lang="en-US" sz="3200" dirty="0" smtClean="0"/>
+            <a:endParaRPr lang="en-US" sz="3200" dirty="0"/>
           </a:p>
           <a:p>
             <a:r>
-              <a:rPr lang="en-US" sz="3200" dirty="0" smtClean="0"/>
+              <a:rPr lang="en-US" sz="3200" dirty="0"/>
               <a:t>Uses </a:t>
             </a:r>
             <a:r>
-              <a:rPr lang="en-US" sz="3200" b="1" dirty="0" smtClean="0"/>
+              <a:rPr lang="en-US" sz="3200" b="1" dirty="0"/>
               <a:t>objects</a:t>
             </a:r>
             <a:r>
-              <a:rPr lang="en-US" sz="3200" dirty="0" smtClean="0"/>
+              <a:rPr lang="en-US" sz="3200" dirty="0"/>
               <a:t> to store HTML elements in JavaScript code</a:t>
             </a:r>
             <a:endParaRPr lang="en-US" sz="4000" dirty="0"/>
@@ -38224,11 +37944,11 @@
           <a:lstStyle/>
           <a:p>
             <a:r>
-              <a:rPr lang="en-US" dirty="0" smtClean="0"/>
+              <a:rPr lang="en-US" dirty="0"/>
               <a:t>The </a:t>
             </a:r>
             <a:r>
-              <a:rPr lang="en-US" dirty="0" smtClean="0">
+              <a:rPr lang="en-US" dirty="0">
                 <a:solidFill>
                   <a:schemeClr val="accent1">
                     <a:lumMod val="40000"/>
@@ -38239,10 +37959,9 @@
               <a:t>object</a:t>
             </a:r>
             <a:r>
-              <a:rPr lang="en-US" dirty="0" smtClean="0"/>
+              <a:rPr lang="en-US" dirty="0"/>
               <a:t> data type</a:t>
             </a:r>
-            <a:endParaRPr lang="en-US" dirty="0"/>
           </a:p>
         </p:txBody>
       </p:sp>
@@ -38264,34 +37983,34 @@
           <a:lstStyle/>
           <a:p>
             <a:r>
-              <a:rPr lang="en-US" sz="3600" dirty="0" smtClean="0"/>
+              <a:rPr lang="en-US" sz="3600" dirty="0"/>
               <a:t>What data types exist in JavaScript?</a:t>
             </a:r>
           </a:p>
           <a:p>
             <a:pPr lvl="1"/>
             <a:r>
-              <a:rPr lang="en-US" sz="3200" dirty="0" smtClean="0"/>
+              <a:rPr lang="en-US" sz="3200" dirty="0"/>
               <a:t>Number</a:t>
             </a:r>
           </a:p>
           <a:p>
             <a:pPr lvl="1"/>
             <a:r>
-              <a:rPr lang="en-US" sz="3200" dirty="0" smtClean="0"/>
+              <a:rPr lang="en-US" sz="3200" dirty="0"/>
               <a:t>String</a:t>
             </a:r>
           </a:p>
           <a:p>
             <a:pPr lvl="1"/>
             <a:r>
-              <a:rPr lang="en-US" sz="3200" dirty="0" smtClean="0"/>
+              <a:rPr lang="en-US" sz="3200" dirty="0"/>
               <a:t>Boolean</a:t>
             </a:r>
           </a:p>
           <a:p>
             <a:pPr lvl="1"/>
-            <a:endParaRPr lang="en-US" sz="3200" dirty="0" smtClean="0"/>
+            <a:endParaRPr lang="en-US" sz="3200" dirty="0"/>
           </a:p>
           <a:p>
             <a:pPr lvl="1"/>
@@ -38299,11 +38018,11 @@
           </a:p>
           <a:p>
             <a:r>
-              <a:rPr lang="en-US" sz="3600" b="1" dirty="0" smtClean="0"/>
+              <a:rPr lang="en-US" sz="3600" b="1" dirty="0"/>
               <a:t>Objects</a:t>
             </a:r>
             <a:r>
-              <a:rPr lang="en-US" sz="3600" dirty="0" smtClean="0"/>
+              <a:rPr lang="en-US" sz="3600" dirty="0"/>
               <a:t> are a data type that can store pretty much anything in JavaScript, including HTML elements!</a:t>
             </a:r>
             <a:endParaRPr lang="en-US" sz="3600" b="1" dirty="0"/>
@@ -38753,10 +38472,9 @@
           <a:lstStyle/>
           <a:p>
             <a:r>
-              <a:rPr lang="en-US" dirty="0" smtClean="0"/>
+              <a:rPr lang="en-US" dirty="0"/>
               <a:t>Storing HTML elements in JavaScript</a:t>
             </a:r>
-            <a:endParaRPr lang="en-US" dirty="0"/>
           </a:p>
         </p:txBody>
       </p:sp>
@@ -38825,25 +38543,7 @@
                 </a:solidFill>
                 <a:latin typeface="Consolas" panose="020B0609020204030204" pitchFamily="49" charset="0"/>
               </a:rPr>
-              <a:t>"</a:t>
-            </a:r>
-            <a:r>
-              <a:rPr lang="en-US" sz="4800" dirty="0" err="1">
-                <a:solidFill>
-                  <a:srgbClr val="0000FF"/>
-                </a:solidFill>
-                <a:latin typeface="Consolas" panose="020B0609020204030204" pitchFamily="49" charset="0"/>
-              </a:rPr>
-              <a:t>myInput</a:t>
-            </a:r>
-            <a:r>
-              <a:rPr lang="en-US" sz="4800" dirty="0">
-                <a:solidFill>
-                  <a:srgbClr val="0000FF"/>
-                </a:solidFill>
-                <a:latin typeface="Consolas" panose="020B0609020204030204" pitchFamily="49" charset="0"/>
-              </a:rPr>
-              <a:t>"</a:t>
+              <a:t>"my-input"</a:t>
             </a:r>
             <a:r>
               <a:rPr lang="en-US" sz="4800" dirty="0">
@@ -38852,7 +38552,7 @@
                 </a:solidFill>
                 <a:latin typeface="Consolas" panose="020B0609020204030204" pitchFamily="49" charset="0"/>
               </a:rPr>
-              <a:t>&gt;</a:t>
+              <a:t> /&gt;</a:t>
             </a:r>
             <a:endParaRPr lang="en-US" sz="4800" dirty="0">
               <a:solidFill>
@@ -38865,22 +38565,22 @@
             <a:pPr marL="57150" indent="0">
               <a:buNone/>
             </a:pPr>
-            <a:endParaRPr lang="en-US" dirty="0" smtClean="0"/>
+            <a:endParaRPr lang="en-US" dirty="0"/>
           </a:p>
           <a:p>
             <a:pPr marL="57150" indent="0">
               <a:buNone/>
             </a:pPr>
             <a:r>
-              <a:rPr lang="en-US" sz="3200" dirty="0" smtClean="0"/>
+              <a:rPr lang="en-US" sz="3200" dirty="0"/>
               <a:t>How could a developer </a:t>
             </a:r>
             <a:r>
-              <a:rPr lang="en-US" sz="3200" u="sng" dirty="0" smtClean="0"/>
+              <a:rPr lang="en-US" sz="3200" u="sng" dirty="0"/>
               <a:t>select</a:t>
             </a:r>
             <a:r>
-              <a:rPr lang="en-US" sz="3200" dirty="0" smtClean="0"/>
+              <a:rPr lang="en-US" sz="3200" dirty="0"/>
               <a:t> this element in CSS?</a:t>
             </a:r>
           </a:p>
@@ -38898,7 +38598,7 @@
               <a:t>#</a:t>
             </a:r>
             <a:r>
-              <a:rPr lang="en-US" sz="3200" i="1" dirty="0" err="1" smtClean="0">
+              <a:rPr lang="en-US" sz="3200" i="1" dirty="0" err="1">
                 <a:solidFill>
                   <a:srgbClr val="800000"/>
                 </a:solidFill>
@@ -38906,7 +38606,7 @@
               </a:rPr>
               <a:t>myInput</a:t>
             </a:r>
-            <a:endParaRPr lang="en-US" sz="3200" i="1" dirty="0" smtClean="0">
+            <a:endParaRPr lang="en-US" sz="3200" i="1" dirty="0">
               <a:solidFill>
                 <a:srgbClr val="800000"/>
               </a:solidFill>
@@ -38929,15 +38629,15 @@
               <a:buNone/>
             </a:pPr>
             <a:r>
-              <a:rPr lang="en-US" sz="3200" dirty="0" smtClean="0"/>
+              <a:rPr lang="en-US" sz="3200" dirty="0"/>
               <a:t>It is also possible to </a:t>
             </a:r>
             <a:r>
-              <a:rPr lang="en-US" sz="3200" u="sng" dirty="0" smtClean="0"/>
+              <a:rPr lang="en-US" sz="3200" u="sng" dirty="0"/>
               <a:t>select</a:t>
             </a:r>
             <a:r>
-              <a:rPr lang="en-US" sz="3200" dirty="0" smtClean="0"/>
+              <a:rPr lang="en-US" sz="3200" dirty="0"/>
               <a:t> an HTML element in JavaScript:</a:t>
             </a:r>
             <a:endParaRPr lang="en-US" sz="3200" dirty="0">
@@ -38952,13 +38652,13 @@
               <a:buNone/>
             </a:pPr>
             <a:r>
-              <a:rPr lang="en-US" sz="3200" dirty="0" err="1">
+              <a:rPr lang="en-US" sz="3200" dirty="0">
                 <a:solidFill>
                   <a:srgbClr val="0000FF"/>
                 </a:solidFill>
                 <a:latin typeface="Consolas" panose="020B0609020204030204" pitchFamily="49" charset="0"/>
               </a:rPr>
-              <a:t>var</a:t>
+              <a:t>let</a:t>
             </a:r>
             <a:r>
               <a:rPr lang="en-US" sz="3200" dirty="0">
@@ -38994,25 +38694,7 @@
                 </a:solidFill>
                 <a:latin typeface="Consolas" panose="020B0609020204030204" pitchFamily="49" charset="0"/>
               </a:rPr>
-              <a:t>"#</a:t>
-            </a:r>
-            <a:r>
-              <a:rPr lang="en-US" sz="3200" dirty="0" err="1">
-                <a:solidFill>
-                  <a:srgbClr val="A31515"/>
-                </a:solidFill>
-                <a:latin typeface="Consolas" panose="020B0609020204030204" pitchFamily="49" charset="0"/>
-              </a:rPr>
-              <a:t>myInput</a:t>
-            </a:r>
-            <a:r>
-              <a:rPr lang="en-US" sz="3200" dirty="0">
-                <a:solidFill>
-                  <a:srgbClr val="A31515"/>
-                </a:solidFill>
-                <a:latin typeface="Consolas" panose="020B0609020204030204" pitchFamily="49" charset="0"/>
-              </a:rPr>
-              <a:t>"</a:t>
+              <a:t>"#my-input"</a:t>
             </a:r>
             <a:r>
               <a:rPr lang="en-US" sz="3200" dirty="0">
@@ -39407,7 +39089,7 @@
         <p:spPr>
           <a:xfrm>
             <a:off x="363239" y="1054923"/>
-            <a:ext cx="11328742" cy="646331"/>
+            <a:ext cx="11582017" cy="646331"/>
           </a:xfrm>
           <a:prstGeom prst="rect">
             <a:avLst/>
@@ -39437,7 +39119,7 @@
               <a:defRPr/>
             </a:pPr>
             <a:r>
-              <a:rPr kumimoji="0" lang="en-US" sz="3600" b="0" i="0" u="none" strike="noStrike" kern="1200" cap="none" spc="0" normalizeH="0" baseline="0" noProof="0" dirty="0" err="1">
+              <a:rPr kumimoji="0" lang="en-US" sz="3600" b="0" i="0" u="none" strike="noStrike" kern="1200" cap="none" spc="0" normalizeH="0" baseline="0" noProof="0" dirty="0">
                 <a:ln>
                   <a:noFill/>
                 </a:ln>
@@ -39451,7 +39133,7 @@
                 <a:ea typeface="+mn-ea"/>
                 <a:cs typeface="+mn-cs"/>
               </a:rPr>
-              <a:t>var</a:t>
+              <a:t>let</a:t>
             </a:r>
             <a:r>
               <a:rPr kumimoji="0" lang="en-US" sz="3600" b="0" i="0" u="none" strike="noStrike" kern="1200" cap="none" spc="0" normalizeH="0" baseline="0" noProof="0" dirty="0">
@@ -39519,41 +39201,7 @@
                 <a:ea typeface="+mn-ea"/>
                 <a:cs typeface="+mn-cs"/>
               </a:rPr>
-              <a:t>"#</a:t>
-            </a:r>
-            <a:r>
-              <a:rPr kumimoji="0" lang="en-US" sz="3600" b="0" i="0" u="none" strike="noStrike" kern="1200" cap="none" spc="0" normalizeH="0" baseline="0" noProof="0" dirty="0" err="1">
-                <a:ln>
-                  <a:noFill/>
-                </a:ln>
-                <a:solidFill>
-                  <a:srgbClr val="A31515"/>
-                </a:solidFill>
-                <a:effectLst/>
-                <a:uLnTx/>
-                <a:uFillTx/>
-                <a:latin typeface="Consolas" panose="020B0609020204030204" pitchFamily="49" charset="0"/>
-                <a:ea typeface="+mn-ea"/>
-                <a:cs typeface="+mn-cs"/>
-              </a:rPr>
-              <a:t>myInput</a:t>
-            </a:r>
-            <a:r>
-              <a:rPr kumimoji="0" lang="en-US" sz="3600" b="0" i="0" u="none" strike="noStrike" kern="1200" cap="none" spc="0" normalizeH="0" baseline="0" noProof="0" dirty="0">
-                <a:ln>
-                  <a:noFill/>
-                </a:ln>
-                <a:solidFill>
-                  <a:srgbClr val="A31515"/>
-                </a:solidFill>
-                <a:effectLst/>
-                <a:uLnTx/>
-                <a:uFillTx/>
-                <a:latin typeface="Consolas" panose="020B0609020204030204" pitchFamily="49" charset="0"/>
-                <a:ea typeface="+mn-ea"/>
-                <a:cs typeface="+mn-cs"/>
-              </a:rPr>
-              <a:t>"</a:t>
+              <a:t>"#my-input"</a:t>
             </a:r>
             <a:r>
               <a:rPr kumimoji="0" lang="en-US" sz="3600" b="0" i="0" u="none" strike="noStrike" kern="1200" cap="none" spc="0" normalizeH="0" baseline="0" noProof="0" dirty="0">
@@ -39689,7 +39337,7 @@
               <a:defRPr/>
             </a:pPr>
             <a:r>
-              <a:rPr kumimoji="0" lang="en-US" sz="3200" b="1" i="0" u="none" strike="noStrike" kern="1200" cap="none" spc="0" normalizeH="0" baseline="0" noProof="0" dirty="0" smtClean="0">
+              <a:rPr kumimoji="0" lang="en-US" sz="3200" b="1" i="0" u="none" strike="noStrike" kern="1200" cap="none" spc="0" normalizeH="0" baseline="0" noProof="0" dirty="0">
                 <a:ln>
                   <a:noFill/>
                 </a:ln>
@@ -39709,7 +39357,7 @@
               <a:t>el</a:t>
             </a:r>
             <a:r>
-              <a:rPr kumimoji="0" lang="en-US" sz="3200" b="0" i="0" u="none" strike="noStrike" kern="1200" cap="none" spc="0" normalizeH="0" baseline="0" noProof="0" dirty="0" smtClean="0">
+              <a:rPr kumimoji="0" lang="en-US" sz="3200" b="0" i="0" u="none" strike="noStrike" kern="1200" cap="none" spc="0" normalizeH="0" baseline="0" noProof="0" dirty="0">
                 <a:ln>
                   <a:noFill/>
                 </a:ln>
@@ -39729,7 +39377,7 @@
               <a:t>: variable storing the entire HTML </a:t>
             </a:r>
             <a:r>
-              <a:rPr kumimoji="0" lang="en-US" sz="3200" b="0" i="0" u="none" strike="noStrike" kern="1200" cap="none" spc="0" normalizeH="0" baseline="0" noProof="0" dirty="0" smtClean="0">
+              <a:rPr kumimoji="0" lang="en-US" sz="3200" b="0" i="0" u="none" strike="noStrike" kern="1200" cap="none" spc="0" normalizeH="0" baseline="0" noProof="0" dirty="0">
                 <a:ln>
                   <a:noFill/>
                 </a:ln>
@@ -39749,7 +39397,7 @@
               <a:t>&lt;input&gt;</a:t>
             </a:r>
             <a:r>
-              <a:rPr kumimoji="0" lang="en-US" sz="3200" b="0" i="0" u="none" strike="noStrike" kern="1200" cap="none" spc="0" normalizeH="0" baseline="0" noProof="0" dirty="0" smtClean="0">
+              <a:rPr kumimoji="0" lang="en-US" sz="3200" b="0" i="0" u="none" strike="noStrike" kern="1200" cap="none" spc="0" normalizeH="0" baseline="0" noProof="0" dirty="0">
                 <a:ln>
                   <a:noFill/>
                 </a:ln>
@@ -40010,7 +39658,7 @@
         </p:nvSpPr>
         <p:spPr>
           <a:xfrm>
-            <a:off x="10789920" y="954593"/>
+            <a:off x="11007206" y="954593"/>
             <a:ext cx="720763" cy="823965"/>
           </a:xfrm>
           <a:prstGeom prst="rect">
@@ -40085,7 +39733,7 @@
         <p:spPr>
           <a:xfrm>
             <a:off x="8702937" y="954593"/>
-            <a:ext cx="2086983" cy="823965"/>
+            <a:ext cx="2304269" cy="823965"/>
           </a:xfrm>
           <a:prstGeom prst="rect">
             <a:avLst/>
@@ -40195,7 +39843,7 @@
               <a:defRPr/>
             </a:pPr>
             <a:r>
-              <a:rPr kumimoji="0" lang="en-US" sz="3200" b="1" i="0" u="none" strike="noStrike" kern="1200" cap="none" spc="0" normalizeH="0" baseline="0" noProof="0" dirty="0" smtClean="0">
+              <a:rPr kumimoji="0" lang="en-US" sz="3200" b="1" i="0" u="none" strike="noStrike" kern="1200" cap="none" spc="0" normalizeH="0" baseline="0" noProof="0" dirty="0">
                 <a:ln>
                   <a:noFill/>
                 </a:ln>
@@ -40209,27 +39857,10 @@
                 <a:ea typeface="+mn-ea"/>
                 <a:cs typeface="+mn-cs"/>
               </a:rPr>
-              <a:t>#</a:t>
+              <a:t>#my-input</a:t>
             </a:r>
             <a:r>
-              <a:rPr kumimoji="0" lang="en-US" sz="3200" b="1" i="0" u="none" strike="noStrike" kern="1200" cap="none" spc="0" normalizeH="0" baseline="0" noProof="0" dirty="0" err="1" smtClean="0">
-                <a:ln>
-                  <a:noFill/>
-                </a:ln>
-                <a:solidFill>
-                  <a:srgbClr val="FF7900"/>
-                </a:solidFill>
-                <a:effectLst/>
-                <a:uLnTx/>
-                <a:uFillTx/>
-                <a:latin typeface="Consolas" panose="020B0609020204030204" pitchFamily="49" charset="0"/>
-                <a:ea typeface="+mn-ea"/>
-                <a:cs typeface="+mn-cs"/>
-              </a:rPr>
-              <a:t>myInput</a:t>
-            </a:r>
-            <a:r>
-              <a:rPr kumimoji="0" lang="en-US" sz="3200" b="0" i="0" u="none" strike="noStrike" kern="1200" cap="none" spc="0" normalizeH="0" baseline="0" noProof="0" dirty="0" smtClean="0">
+              <a:rPr kumimoji="0" lang="en-US" sz="3200" b="0" i="0" u="none" strike="noStrike" kern="1200" cap="none" spc="0" normalizeH="0" baseline="0" noProof="0" dirty="0">
                 <a:ln>
                   <a:noFill/>
                 </a:ln>
@@ -40246,7 +39877,7 @@
               <a:t>: </a:t>
             </a:r>
             <a:r>
-              <a:rPr kumimoji="0" lang="en-US" sz="3200" b="0" i="1" u="none" strike="noStrike" kern="1200" cap="none" spc="0" normalizeH="0" baseline="0" noProof="0" dirty="0" smtClean="0">
+              <a:rPr kumimoji="0" lang="en-US" sz="3200" b="0" i="1" u="none" strike="noStrike" kern="1200" cap="none" spc="0" normalizeH="0" baseline="0" noProof="0" dirty="0">
                 <a:ln>
                   <a:noFill/>
                 </a:ln>
@@ -40263,7 +39894,7 @@
               <a:t>selector</a:t>
             </a:r>
             <a:r>
-              <a:rPr kumimoji="0" lang="en-US" sz="3200" b="0" i="0" u="none" strike="noStrike" kern="1200" cap="none" spc="0" normalizeH="0" baseline="0" noProof="0" dirty="0" smtClean="0">
+              <a:rPr kumimoji="0" lang="en-US" sz="3200" b="0" i="0" u="none" strike="noStrike" kern="1200" cap="none" spc="0" normalizeH="0" baseline="0" noProof="0" dirty="0">
                 <a:ln>
                   <a:noFill/>
                 </a:ln>
@@ -40280,7 +39911,7 @@
               <a:t> to tell the </a:t>
             </a:r>
             <a:r>
-              <a:rPr kumimoji="0" lang="en-US" sz="3200" b="0" i="0" u="none" strike="noStrike" kern="1200" cap="none" spc="0" normalizeH="0" baseline="0" noProof="0" dirty="0" err="1" smtClean="0">
+              <a:rPr kumimoji="0" lang="en-US" sz="3200" b="0" i="0" u="none" strike="noStrike" kern="1200" cap="none" spc="0" normalizeH="0" baseline="0" noProof="0" dirty="0" err="1">
                 <a:ln>
                   <a:noFill/>
                 </a:ln>
@@ -40297,7 +39928,7 @@
               <a:t>querySelector</a:t>
             </a:r>
             <a:r>
-              <a:rPr kumimoji="0" lang="en-US" sz="3200" b="0" i="0" u="none" strike="noStrike" kern="1200" cap="none" spc="0" normalizeH="0" baseline="0" noProof="0" dirty="0" smtClean="0">
+              <a:rPr kumimoji="0" lang="en-US" sz="3200" b="0" i="0" u="none" strike="noStrike" kern="1200" cap="none" spc="0" normalizeH="0" baseline="0" noProof="0" dirty="0">
                 <a:ln>
                   <a:noFill/>
                 </a:ln>
@@ -40379,10 +40010,9 @@
           <a:lstStyle/>
           <a:p>
             <a:r>
-              <a:rPr lang="en-US" dirty="0" smtClean="0"/>
+              <a:rPr lang="en-US" dirty="0"/>
               <a:t>Breaking down the example statement</a:t>
             </a:r>
-            <a:endParaRPr lang="en-US" dirty="0"/>
           </a:p>
         </p:txBody>
       </p:sp>
@@ -41039,10 +40669,9 @@
           <a:lstStyle/>
           <a:p>
             <a:r>
-              <a:rPr lang="en-US" dirty="0" smtClean="0"/>
+              <a:rPr lang="en-US" dirty="0"/>
               <a:t>Getting the text value from the user input</a:t>
             </a:r>
-            <a:endParaRPr lang="en-US" dirty="0"/>
           </a:p>
         </p:txBody>
       </p:sp>
@@ -41077,13 +40706,13 @@
               <a:buNone/>
             </a:pPr>
             <a:r>
-              <a:rPr lang="en-US" sz="3600" dirty="0" err="1">
+              <a:rPr lang="en-US" sz="3600" dirty="0">
                 <a:solidFill>
                   <a:srgbClr val="0000FF"/>
                 </a:solidFill>
                 <a:latin typeface="Consolas" panose="020B0609020204030204" pitchFamily="49" charset="0"/>
               </a:rPr>
-              <a:t>var</a:t>
+              <a:t>let</a:t>
             </a:r>
             <a:r>
               <a:rPr lang="en-US" sz="3600" dirty="0">
@@ -41119,25 +40748,7 @@
                 </a:solidFill>
                 <a:latin typeface="Consolas" panose="020B0609020204030204" pitchFamily="49" charset="0"/>
               </a:rPr>
-              <a:t>"#</a:t>
-            </a:r>
-            <a:r>
-              <a:rPr lang="en-US" sz="3600" dirty="0" err="1">
-                <a:solidFill>
-                  <a:srgbClr val="A31515"/>
-                </a:solidFill>
-                <a:latin typeface="Consolas" panose="020B0609020204030204" pitchFamily="49" charset="0"/>
-              </a:rPr>
-              <a:t>myInput</a:t>
-            </a:r>
-            <a:r>
-              <a:rPr lang="en-US" sz="3600" dirty="0">
-                <a:solidFill>
-                  <a:srgbClr val="A31515"/>
-                </a:solidFill>
-                <a:latin typeface="Consolas" panose="020B0609020204030204" pitchFamily="49" charset="0"/>
-              </a:rPr>
-              <a:t>"</a:t>
+              <a:t>"#my-input"</a:t>
             </a:r>
             <a:r>
               <a:rPr lang="en-US" sz="3600" dirty="0">
@@ -41164,13 +40775,13 @@
               <a:buNone/>
             </a:pPr>
             <a:r>
-              <a:rPr lang="en-US" sz="3600" dirty="0" err="1">
+              <a:rPr lang="en-US" sz="3600" dirty="0">
                 <a:solidFill>
                   <a:srgbClr val="0000FF"/>
                 </a:solidFill>
                 <a:latin typeface="Consolas" panose="020B0609020204030204" pitchFamily="49" charset="0"/>
               </a:rPr>
-              <a:t>var</a:t>
+              <a:t>let</a:t>
             </a:r>
             <a:r>
               <a:rPr lang="en-US" sz="3600" dirty="0">
@@ -41222,26 +40833,26 @@
             <a:pPr marL="57150" indent="0">
               <a:buNone/>
             </a:pPr>
-            <a:endParaRPr lang="en-US" dirty="0" smtClean="0"/>
+            <a:endParaRPr lang="en-US" dirty="0"/>
           </a:p>
           <a:p>
             <a:pPr marL="57150" indent="0">
               <a:buNone/>
             </a:pPr>
-            <a:endParaRPr lang="en-US" dirty="0" smtClean="0"/>
+            <a:endParaRPr lang="en-US" dirty="0"/>
           </a:p>
           <a:p>
             <a:pPr marL="57150" indent="0">
               <a:buNone/>
             </a:pPr>
-            <a:endParaRPr lang="en-US" dirty="0" smtClean="0"/>
+            <a:endParaRPr lang="en-US" dirty="0"/>
           </a:p>
           <a:p>
             <a:pPr marL="57150" indent="0">
               <a:buNone/>
             </a:pPr>
             <a:r>
-              <a:rPr lang="en-US" sz="4400" b="1" dirty="0" smtClean="0">
+              <a:rPr lang="en-US" sz="4400" b="1" dirty="0">
                 <a:solidFill>
                   <a:schemeClr val="accent1"/>
                 </a:solidFill>
@@ -41250,7 +40861,7 @@
               <a:t>.value</a:t>
             </a:r>
             <a:r>
-              <a:rPr lang="en-US" sz="3600" dirty="0" smtClean="0"/>
+              <a:rPr lang="en-US" sz="3600" dirty="0"/>
               <a:t> will get the text the user entered into the input</a:t>
             </a:r>
           </a:p>
@@ -41260,14 +40871,10 @@
             </a:pPr>
             <a:r>
               <a:rPr lang="en-US" sz="3600" dirty="0"/>
-              <a:t>I</a:t>
+              <a:t>It will be stored in the </a:t>
             </a:r>
             <a:r>
-              <a:rPr lang="en-US" sz="3600" dirty="0" smtClean="0"/>
-              <a:t>t will be stored in the </a:t>
-            </a:r>
-            <a:r>
-              <a:rPr lang="en-US" sz="4400" b="1" dirty="0" err="1" smtClean="0">
+              <a:rPr lang="en-US" sz="4400" b="1" dirty="0" err="1">
                 <a:solidFill>
                   <a:schemeClr val="accent2"/>
                 </a:solidFill>
@@ -41276,10 +40883,9 @@
               <a:t>elementTextValue</a:t>
             </a:r>
             <a:r>
-              <a:rPr lang="en-US" sz="3600" dirty="0" smtClean="0"/>
+              <a:rPr lang="en-US" sz="3600" dirty="0"/>
               <a:t> variable</a:t>
             </a:r>
-            <a:endParaRPr lang="en-US" sz="3600" dirty="0"/>
           </a:p>
         </p:txBody>
       </p:sp>
@@ -41346,7 +40952,7 @@
                 <a:spcPct val="0"/>
               </a:spcAft>
             </a:pPr>
-            <a:endParaRPr lang="en-US" sz="2400" dirty="0" err="1" smtClean="0">
+            <a:endParaRPr lang="en-US" sz="2400" dirty="0" err="1">
               <a:gradFill>
                 <a:gsLst>
                   <a:gs pos="0">
@@ -41427,7 +41033,7 @@
                 <a:spcPct val="0"/>
               </a:spcAft>
             </a:pPr>
-            <a:endParaRPr lang="en-US" sz="2400" dirty="0" err="1" smtClean="0">
+            <a:endParaRPr lang="en-US" sz="2400" dirty="0" err="1">
               <a:gradFill>
                 <a:gsLst>
                   <a:gs pos="0">

</xml_diff>